<commit_message>
Add border to title
</commit_message>
<xml_diff>
--- a/LayoutDesign.pptx
+++ b/LayoutDesign.pptx
@@ -37,7 +37,7 @@
             <a:spLocks noGrp="1"/>
           </p:cNvSpPr>
           <p:nvPr>
-            <p:ph type="ftr" idx="2"/>
+            <p:ph type="ftr" idx="1"/>
           </p:nvPr>
         </p:nvSpPr>
         <p:spPr/>
@@ -57,14 +57,14 @@
             <a:spLocks noGrp="1"/>
           </p:cNvSpPr>
           <p:nvPr>
-            <p:ph type="sldNum" idx="3"/>
+            <p:ph type="sldNum" idx="2"/>
           </p:nvPr>
         </p:nvSpPr>
         <p:spPr/>
         <p:txBody>
           <a:bodyPr/>
           <a:p>
-            <a:fld id="{3ECEFB94-BBB8-4E9D-B74B-F3D899A6C64C}" type="slidenum">
+            <a:fld id="{5B06A7D9-7448-4CB6-9B4E-DD34FBF2A62B}" type="slidenum">
               <a:t>&lt;#&gt;</a:t>
             </a:fld>
           </a:p>
@@ -77,7 +77,7 @@
             <a:spLocks noGrp="1"/>
           </p:cNvSpPr>
           <p:nvPr>
-            <p:ph type="dt" idx="1"/>
+            <p:ph type="dt" idx="3"/>
           </p:nvPr>
         </p:nvSpPr>
         <p:spPr/>
@@ -126,7 +126,7 @@
         <p:spPr>
           <a:xfrm>
             <a:off x="450000" y="358560"/>
-            <a:ext cx="8099640" cy="1502280"/>
+            <a:ext cx="8099280" cy="1501920"/>
           </a:xfrm>
           <a:prstGeom prst="rect">
             <a:avLst/>
@@ -144,7 +144,7 @@
             <a:pPr algn="ctr">
               <a:buNone/>
             </a:pPr>
-            <a:endParaRPr b="0" lang="en-GB" sz="6980" spc="-1" strike="noStrike">
+            <a:endParaRPr b="0" lang="en-GB" sz="4400" spc="-1" strike="noStrike">
               <a:latin typeface="Arial"/>
             </a:endParaRPr>
           </a:p>
@@ -162,8 +162,8 @@
         </p:nvSpPr>
         <p:spPr>
           <a:xfrm>
-            <a:off x="450000" y="2105640"/>
-            <a:ext cx="8099640" cy="2489400"/>
+            <a:off x="449640" y="2105640"/>
+            <a:ext cx="8099280" cy="2489400"/>
           </a:xfrm>
           <a:prstGeom prst="rect">
             <a:avLst/>
@@ -178,7 +178,7 @@
             <a:normAutofit/>
           </a:bodyPr>
           <a:p>
-            <a:endParaRPr b="0" lang="en-GB" sz="5080" spc="-1" strike="noStrike">
+            <a:endParaRPr b="0" lang="en-GB" sz="3200" spc="-1" strike="noStrike">
               <a:latin typeface="Arial"/>
             </a:endParaRPr>
           </a:p>
@@ -196,8 +196,8 @@
         </p:nvSpPr>
         <p:spPr>
           <a:xfrm>
-            <a:off x="450000" y="4831920"/>
-            <a:ext cx="8099640" cy="2489400"/>
+            <a:off x="449640" y="4831920"/>
+            <a:ext cx="8099280" cy="2489400"/>
           </a:xfrm>
           <a:prstGeom prst="rect">
             <a:avLst/>
@@ -212,7 +212,7 @@
             <a:normAutofit/>
           </a:bodyPr>
           <a:p>
-            <a:endParaRPr b="0" lang="en-GB" sz="5080" spc="-1" strike="noStrike">
+            <a:endParaRPr b="0" lang="en-GB" sz="3200" spc="-1" strike="noStrike">
               <a:latin typeface="Arial"/>
             </a:endParaRPr>
           </a:p>
@@ -225,7 +225,7 @@
             <a:spLocks noGrp="1"/>
           </p:cNvSpPr>
           <p:nvPr>
-            <p:ph type="ftr" idx="2"/>
+            <p:ph type="ftr" idx="1"/>
           </p:nvPr>
         </p:nvSpPr>
         <p:spPr/>
@@ -245,14 +245,14 @@
             <a:spLocks noGrp="1"/>
           </p:cNvSpPr>
           <p:nvPr>
-            <p:ph type="sldNum" idx="3"/>
+            <p:ph type="sldNum" idx="2"/>
           </p:nvPr>
         </p:nvSpPr>
         <p:spPr/>
         <p:txBody>
           <a:bodyPr/>
           <a:p>
-            <a:fld id="{7034BD4A-8B65-4FC1-A63F-42710667DB0C}" type="slidenum">
+            <a:fld id="{A389B31F-09C4-429D-9AC3-97D3DE35F63A}" type="slidenum">
               <a:t>&lt;#&gt;</a:t>
             </a:fld>
           </a:p>
@@ -265,7 +265,7 @@
             <a:spLocks noGrp="1"/>
           </p:cNvSpPr>
           <p:nvPr>
-            <p:ph type="dt" idx="1"/>
+            <p:ph type="dt" idx="3"/>
           </p:nvPr>
         </p:nvSpPr>
         <p:spPr/>
@@ -314,7 +314,7 @@
         <p:spPr>
           <a:xfrm>
             <a:off x="450000" y="358560"/>
-            <a:ext cx="8099640" cy="1502280"/>
+            <a:ext cx="8099280" cy="1501920"/>
           </a:xfrm>
           <a:prstGeom prst="rect">
             <a:avLst/>
@@ -332,7 +332,7 @@
             <a:pPr algn="ctr">
               <a:buNone/>
             </a:pPr>
-            <a:endParaRPr b="0" lang="en-GB" sz="6980" spc="-1" strike="noStrike">
+            <a:endParaRPr b="0" lang="en-GB" sz="4400" spc="-1" strike="noStrike">
               <a:latin typeface="Arial"/>
             </a:endParaRPr>
           </a:p>
@@ -350,7 +350,7 @@
         </p:nvSpPr>
         <p:spPr>
           <a:xfrm>
-            <a:off x="450000" y="2105640"/>
+            <a:off x="449640" y="2105640"/>
             <a:ext cx="3952440" cy="2489400"/>
           </a:xfrm>
           <a:prstGeom prst="rect">
@@ -366,7 +366,7 @@
             <a:normAutofit/>
           </a:bodyPr>
           <a:p>
-            <a:endParaRPr b="0" lang="en-GB" sz="5080" spc="-1" strike="noStrike">
+            <a:endParaRPr b="0" lang="en-GB" sz="3200" spc="-1" strike="noStrike">
               <a:latin typeface="Arial"/>
             </a:endParaRPr>
           </a:p>
@@ -384,7 +384,7 @@
         </p:nvSpPr>
         <p:spPr>
           <a:xfrm>
-            <a:off x="4600440" y="2105640"/>
+            <a:off x="4600080" y="2105640"/>
             <a:ext cx="3952440" cy="2489400"/>
           </a:xfrm>
           <a:prstGeom prst="rect">
@@ -400,7 +400,7 @@
             <a:normAutofit/>
           </a:bodyPr>
           <a:p>
-            <a:endParaRPr b="0" lang="en-GB" sz="5080" spc="-1" strike="noStrike">
+            <a:endParaRPr b="0" lang="en-GB" sz="3200" spc="-1" strike="noStrike">
               <a:latin typeface="Arial"/>
             </a:endParaRPr>
           </a:p>
@@ -418,7 +418,7 @@
         </p:nvSpPr>
         <p:spPr>
           <a:xfrm>
-            <a:off x="450000" y="4831920"/>
+            <a:off x="449640" y="4831920"/>
             <a:ext cx="3952440" cy="2489400"/>
           </a:xfrm>
           <a:prstGeom prst="rect">
@@ -434,7 +434,7 @@
             <a:normAutofit/>
           </a:bodyPr>
           <a:p>
-            <a:endParaRPr b="0" lang="en-GB" sz="5080" spc="-1" strike="noStrike">
+            <a:endParaRPr b="0" lang="en-GB" sz="3200" spc="-1" strike="noStrike">
               <a:latin typeface="Arial"/>
             </a:endParaRPr>
           </a:p>
@@ -452,7 +452,7 @@
         </p:nvSpPr>
         <p:spPr>
           <a:xfrm>
-            <a:off x="4600440" y="4831920"/>
+            <a:off x="4600080" y="4831920"/>
             <a:ext cx="3952440" cy="2489400"/>
           </a:xfrm>
           <a:prstGeom prst="rect">
@@ -468,7 +468,7 @@
             <a:normAutofit/>
           </a:bodyPr>
           <a:p>
-            <a:endParaRPr b="0" lang="en-GB" sz="5080" spc="-1" strike="noStrike">
+            <a:endParaRPr b="0" lang="en-GB" sz="3200" spc="-1" strike="noStrike">
               <a:latin typeface="Arial"/>
             </a:endParaRPr>
           </a:p>
@@ -481,7 +481,7 @@
             <a:spLocks noGrp="1"/>
           </p:cNvSpPr>
           <p:nvPr>
-            <p:ph type="ftr" idx="2"/>
+            <p:ph type="ftr" idx="1"/>
           </p:nvPr>
         </p:nvSpPr>
         <p:spPr/>
@@ -501,14 +501,14 @@
             <a:spLocks noGrp="1"/>
           </p:cNvSpPr>
           <p:nvPr>
-            <p:ph type="sldNum" idx="3"/>
+            <p:ph type="sldNum" idx="2"/>
           </p:nvPr>
         </p:nvSpPr>
         <p:spPr/>
         <p:txBody>
           <a:bodyPr/>
           <a:p>
-            <a:fld id="{111F61FA-C4D3-4ABE-98B1-76D9E8C43B97}" type="slidenum">
+            <a:fld id="{C019BF81-85D3-492C-85DF-B3F938659444}" type="slidenum">
               <a:t>&lt;#&gt;</a:t>
             </a:fld>
           </a:p>
@@ -521,7 +521,7 @@
             <a:spLocks noGrp="1"/>
           </p:cNvSpPr>
           <p:nvPr>
-            <p:ph type="dt" idx="1"/>
+            <p:ph type="dt" idx="3"/>
           </p:nvPr>
         </p:nvSpPr>
         <p:spPr/>
@@ -570,7 +570,7 @@
         <p:spPr>
           <a:xfrm>
             <a:off x="450000" y="358560"/>
-            <a:ext cx="8099640" cy="1502280"/>
+            <a:ext cx="8099280" cy="1501920"/>
           </a:xfrm>
           <a:prstGeom prst="rect">
             <a:avLst/>
@@ -588,7 +588,7 @@
             <a:pPr algn="ctr">
               <a:buNone/>
             </a:pPr>
-            <a:endParaRPr b="0" lang="en-GB" sz="6980" spc="-1" strike="noStrike">
+            <a:endParaRPr b="0" lang="en-GB" sz="4400" spc="-1" strike="noStrike">
               <a:latin typeface="Arial"/>
             </a:endParaRPr>
           </a:p>
@@ -606,7 +606,7 @@
         </p:nvSpPr>
         <p:spPr>
           <a:xfrm>
-            <a:off x="450000" y="2105640"/>
+            <a:off x="449640" y="2105640"/>
             <a:ext cx="2607840" cy="2489400"/>
           </a:xfrm>
           <a:prstGeom prst="rect">
@@ -622,7 +622,7 @@
             <a:normAutofit/>
           </a:bodyPr>
           <a:p>
-            <a:endParaRPr b="0" lang="en-GB" sz="5080" spc="-1" strike="noStrike">
+            <a:endParaRPr b="0" lang="en-GB" sz="3200" spc="-1" strike="noStrike">
               <a:latin typeface="Arial"/>
             </a:endParaRPr>
           </a:p>
@@ -640,7 +640,7 @@
         </p:nvSpPr>
         <p:spPr>
           <a:xfrm>
-            <a:off x="3188520" y="2105640"/>
+            <a:off x="3188160" y="2105640"/>
             <a:ext cx="2607840" cy="2489400"/>
           </a:xfrm>
           <a:prstGeom prst="rect">
@@ -656,7 +656,7 @@
             <a:normAutofit/>
           </a:bodyPr>
           <a:p>
-            <a:endParaRPr b="0" lang="en-GB" sz="5080" spc="-1" strike="noStrike">
+            <a:endParaRPr b="0" lang="en-GB" sz="3200" spc="-1" strike="noStrike">
               <a:latin typeface="Arial"/>
             </a:endParaRPr>
           </a:p>
@@ -674,7 +674,7 @@
         </p:nvSpPr>
         <p:spPr>
           <a:xfrm>
-            <a:off x="5927400" y="2105640"/>
+            <a:off x="5927040" y="2105640"/>
             <a:ext cx="2607840" cy="2489400"/>
           </a:xfrm>
           <a:prstGeom prst="rect">
@@ -690,7 +690,7 @@
             <a:normAutofit/>
           </a:bodyPr>
           <a:p>
-            <a:endParaRPr b="0" lang="en-GB" sz="5080" spc="-1" strike="noStrike">
+            <a:endParaRPr b="0" lang="en-GB" sz="3200" spc="-1" strike="noStrike">
               <a:latin typeface="Arial"/>
             </a:endParaRPr>
           </a:p>
@@ -708,7 +708,7 @@
         </p:nvSpPr>
         <p:spPr>
           <a:xfrm>
-            <a:off x="450000" y="4831920"/>
+            <a:off x="449640" y="4831920"/>
             <a:ext cx="2607840" cy="2489400"/>
           </a:xfrm>
           <a:prstGeom prst="rect">
@@ -724,7 +724,7 @@
             <a:normAutofit/>
           </a:bodyPr>
           <a:p>
-            <a:endParaRPr b="0" lang="en-GB" sz="5080" spc="-1" strike="noStrike">
+            <a:endParaRPr b="0" lang="en-GB" sz="3200" spc="-1" strike="noStrike">
               <a:latin typeface="Arial"/>
             </a:endParaRPr>
           </a:p>
@@ -742,7 +742,7 @@
         </p:nvSpPr>
         <p:spPr>
           <a:xfrm>
-            <a:off x="3188520" y="4831920"/>
+            <a:off x="3188160" y="4831920"/>
             <a:ext cx="2607840" cy="2489400"/>
           </a:xfrm>
           <a:prstGeom prst="rect">
@@ -758,7 +758,7 @@
             <a:normAutofit/>
           </a:bodyPr>
           <a:p>
-            <a:endParaRPr b="0" lang="en-GB" sz="5080" spc="-1" strike="noStrike">
+            <a:endParaRPr b="0" lang="en-GB" sz="3200" spc="-1" strike="noStrike">
               <a:latin typeface="Arial"/>
             </a:endParaRPr>
           </a:p>
@@ -776,7 +776,7 @@
         </p:nvSpPr>
         <p:spPr>
           <a:xfrm>
-            <a:off x="5927400" y="4831920"/>
+            <a:off x="5927040" y="4831920"/>
             <a:ext cx="2607840" cy="2489400"/>
           </a:xfrm>
           <a:prstGeom prst="rect">
@@ -792,7 +792,7 @@
             <a:normAutofit/>
           </a:bodyPr>
           <a:p>
-            <a:endParaRPr b="0" lang="en-GB" sz="5080" spc="-1" strike="noStrike">
+            <a:endParaRPr b="0" lang="en-GB" sz="3200" spc="-1" strike="noStrike">
               <a:latin typeface="Arial"/>
             </a:endParaRPr>
           </a:p>
@@ -805,7 +805,7 @@
             <a:spLocks noGrp="1"/>
           </p:cNvSpPr>
           <p:nvPr>
-            <p:ph type="ftr" idx="2"/>
+            <p:ph type="ftr" idx="1"/>
           </p:nvPr>
         </p:nvSpPr>
         <p:spPr/>
@@ -825,14 +825,14 @@
             <a:spLocks noGrp="1"/>
           </p:cNvSpPr>
           <p:nvPr>
-            <p:ph type="sldNum" idx="3"/>
+            <p:ph type="sldNum" idx="2"/>
           </p:nvPr>
         </p:nvSpPr>
         <p:spPr/>
         <p:txBody>
           <a:bodyPr/>
           <a:p>
-            <a:fld id="{7840B55D-85F3-4C6D-856C-6AF44AAB87AA}" type="slidenum">
+            <a:fld id="{6D64DB07-EA0F-4691-90A2-D4207776DB6D}" type="slidenum">
               <a:t>&lt;#&gt;</a:t>
             </a:fld>
           </a:p>
@@ -845,7 +845,7 @@
             <a:spLocks noGrp="1"/>
           </p:cNvSpPr>
           <p:nvPr>
-            <p:ph type="dt" idx="1"/>
+            <p:ph type="dt" idx="3"/>
           </p:nvPr>
         </p:nvSpPr>
         <p:spPr/>
@@ -894,7 +894,7 @@
         <p:spPr>
           <a:xfrm>
             <a:off x="450000" y="358560"/>
-            <a:ext cx="8099640" cy="1502280"/>
+            <a:ext cx="8099280" cy="1501920"/>
           </a:xfrm>
           <a:prstGeom prst="rect">
             <a:avLst/>
@@ -912,7 +912,7 @@
             <a:pPr algn="ctr">
               <a:buNone/>
             </a:pPr>
-            <a:endParaRPr b="0" lang="en-GB" sz="6980" spc="-1" strike="noStrike">
+            <a:endParaRPr b="0" lang="en-GB" sz="4400" spc="-1" strike="noStrike">
               <a:latin typeface="Arial"/>
             </a:endParaRPr>
           </a:p>
@@ -930,8 +930,8 @@
         </p:nvSpPr>
         <p:spPr>
           <a:xfrm>
-            <a:off x="450000" y="2105640"/>
-            <a:ext cx="8099640" cy="5219280"/>
+            <a:off x="449640" y="2105640"/>
+            <a:ext cx="8099280" cy="5219280"/>
           </a:xfrm>
           <a:prstGeom prst="rect">
             <a:avLst/>
@@ -962,7 +962,7 @@
             <a:spLocks noGrp="1"/>
           </p:cNvSpPr>
           <p:nvPr>
-            <p:ph type="ftr" idx="2"/>
+            <p:ph type="ftr" idx="1"/>
           </p:nvPr>
         </p:nvSpPr>
         <p:spPr/>
@@ -982,14 +982,14 @@
             <a:spLocks noGrp="1"/>
           </p:cNvSpPr>
           <p:nvPr>
-            <p:ph type="sldNum" idx="3"/>
+            <p:ph type="sldNum" idx="2"/>
           </p:nvPr>
         </p:nvSpPr>
         <p:spPr/>
         <p:txBody>
           <a:bodyPr/>
           <a:p>
-            <a:fld id="{9B9DCE4A-0022-49B5-9736-3F2C78686148}" type="slidenum">
+            <a:fld id="{4312833B-F7CD-4BF9-B149-782A5CF4AB6A}" type="slidenum">
               <a:t>&lt;#&gt;</a:t>
             </a:fld>
           </a:p>
@@ -1002,7 +1002,7 @@
             <a:spLocks noGrp="1"/>
           </p:cNvSpPr>
           <p:nvPr>
-            <p:ph type="dt" idx="1"/>
+            <p:ph type="dt" idx="3"/>
           </p:nvPr>
         </p:nvSpPr>
         <p:spPr/>
@@ -1051,7 +1051,7 @@
         <p:spPr>
           <a:xfrm>
             <a:off x="450000" y="358560"/>
-            <a:ext cx="8099640" cy="1502280"/>
+            <a:ext cx="8099280" cy="1501920"/>
           </a:xfrm>
           <a:prstGeom prst="rect">
             <a:avLst/>
@@ -1069,7 +1069,7 @@
             <a:pPr algn="ctr">
               <a:buNone/>
             </a:pPr>
-            <a:endParaRPr b="0" lang="en-GB" sz="6980" spc="-1" strike="noStrike">
+            <a:endParaRPr b="0" lang="en-GB" sz="4400" spc="-1" strike="noStrike">
               <a:latin typeface="Arial"/>
             </a:endParaRPr>
           </a:p>
@@ -1087,8 +1087,8 @@
         </p:nvSpPr>
         <p:spPr>
           <a:xfrm>
-            <a:off x="450000" y="2105640"/>
-            <a:ext cx="8099640" cy="5219280"/>
+            <a:off x="449640" y="2105640"/>
+            <a:ext cx="8099280" cy="5219280"/>
           </a:xfrm>
           <a:prstGeom prst="rect">
             <a:avLst/>
@@ -1103,7 +1103,7 @@
             <a:normAutofit/>
           </a:bodyPr>
           <a:p>
-            <a:endParaRPr b="0" lang="en-GB" sz="5080" spc="-1" strike="noStrike">
+            <a:endParaRPr b="0" lang="en-GB" sz="3200" spc="-1" strike="noStrike">
               <a:latin typeface="Arial"/>
             </a:endParaRPr>
           </a:p>
@@ -1116,7 +1116,7 @@
             <a:spLocks noGrp="1"/>
           </p:cNvSpPr>
           <p:nvPr>
-            <p:ph type="ftr" idx="2"/>
+            <p:ph type="ftr" idx="1"/>
           </p:nvPr>
         </p:nvSpPr>
         <p:spPr/>
@@ -1136,14 +1136,14 @@
             <a:spLocks noGrp="1"/>
           </p:cNvSpPr>
           <p:nvPr>
-            <p:ph type="sldNum" idx="3"/>
+            <p:ph type="sldNum" idx="2"/>
           </p:nvPr>
         </p:nvSpPr>
         <p:spPr/>
         <p:txBody>
           <a:bodyPr/>
           <a:p>
-            <a:fld id="{967CF964-EA18-42A7-A402-32A6B2C1EB9A}" type="slidenum">
+            <a:fld id="{ED27BB97-7798-4DAE-B3E5-83909CE709A2}" type="slidenum">
               <a:t>&lt;#&gt;</a:t>
             </a:fld>
           </a:p>
@@ -1156,7 +1156,7 @@
             <a:spLocks noGrp="1"/>
           </p:cNvSpPr>
           <p:nvPr>
-            <p:ph type="dt" idx="1"/>
+            <p:ph type="dt" idx="3"/>
           </p:nvPr>
         </p:nvSpPr>
         <p:spPr/>
@@ -1205,7 +1205,7 @@
         <p:spPr>
           <a:xfrm>
             <a:off x="450000" y="358560"/>
-            <a:ext cx="8099640" cy="1502280"/>
+            <a:ext cx="8099280" cy="1501920"/>
           </a:xfrm>
           <a:prstGeom prst="rect">
             <a:avLst/>
@@ -1223,7 +1223,7 @@
             <a:pPr algn="ctr">
               <a:buNone/>
             </a:pPr>
-            <a:endParaRPr b="0" lang="en-GB" sz="6980" spc="-1" strike="noStrike">
+            <a:endParaRPr b="0" lang="en-GB" sz="4400" spc="-1" strike="noStrike">
               <a:latin typeface="Arial"/>
             </a:endParaRPr>
           </a:p>
@@ -1241,7 +1241,7 @@
         </p:nvSpPr>
         <p:spPr>
           <a:xfrm>
-            <a:off x="450000" y="2105640"/>
+            <a:off x="449640" y="2105640"/>
             <a:ext cx="3952440" cy="5219280"/>
           </a:xfrm>
           <a:prstGeom prst="rect">
@@ -1257,7 +1257,7 @@
             <a:normAutofit/>
           </a:bodyPr>
           <a:p>
-            <a:endParaRPr b="0" lang="en-GB" sz="5080" spc="-1" strike="noStrike">
+            <a:endParaRPr b="0" lang="en-GB" sz="3200" spc="-1" strike="noStrike">
               <a:latin typeface="Arial"/>
             </a:endParaRPr>
           </a:p>
@@ -1275,7 +1275,7 @@
         </p:nvSpPr>
         <p:spPr>
           <a:xfrm>
-            <a:off x="4600440" y="2105640"/>
+            <a:off x="4600080" y="2105640"/>
             <a:ext cx="3952440" cy="5219280"/>
           </a:xfrm>
           <a:prstGeom prst="rect">
@@ -1291,7 +1291,7 @@
             <a:normAutofit/>
           </a:bodyPr>
           <a:p>
-            <a:endParaRPr b="0" lang="en-GB" sz="5080" spc="-1" strike="noStrike">
+            <a:endParaRPr b="0" lang="en-GB" sz="3200" spc="-1" strike="noStrike">
               <a:latin typeface="Arial"/>
             </a:endParaRPr>
           </a:p>
@@ -1304,7 +1304,7 @@
             <a:spLocks noGrp="1"/>
           </p:cNvSpPr>
           <p:nvPr>
-            <p:ph type="ftr" idx="2"/>
+            <p:ph type="ftr" idx="1"/>
           </p:nvPr>
         </p:nvSpPr>
         <p:spPr/>
@@ -1324,14 +1324,14 @@
             <a:spLocks noGrp="1"/>
           </p:cNvSpPr>
           <p:nvPr>
-            <p:ph type="sldNum" idx="3"/>
+            <p:ph type="sldNum" idx="2"/>
           </p:nvPr>
         </p:nvSpPr>
         <p:spPr/>
         <p:txBody>
           <a:bodyPr/>
           <a:p>
-            <a:fld id="{D2B6E735-F65C-44B0-B9D4-4B14BD33D5AD}" type="slidenum">
+            <a:fld id="{AE419D13-A668-498E-8189-795DDB57C5DD}" type="slidenum">
               <a:t>&lt;#&gt;</a:t>
             </a:fld>
           </a:p>
@@ -1344,7 +1344,7 @@
             <a:spLocks noGrp="1"/>
           </p:cNvSpPr>
           <p:nvPr>
-            <p:ph type="dt" idx="1"/>
+            <p:ph type="dt" idx="3"/>
           </p:nvPr>
         </p:nvSpPr>
         <p:spPr/>
@@ -1393,7 +1393,7 @@
         <p:spPr>
           <a:xfrm>
             <a:off x="450000" y="358560"/>
-            <a:ext cx="8099640" cy="1502280"/>
+            <a:ext cx="8099280" cy="1501920"/>
           </a:xfrm>
           <a:prstGeom prst="rect">
             <a:avLst/>
@@ -1411,7 +1411,7 @@
             <a:pPr algn="ctr">
               <a:buNone/>
             </a:pPr>
-            <a:endParaRPr b="0" lang="en-GB" sz="6980" spc="-1" strike="noStrike">
+            <a:endParaRPr b="0" lang="en-GB" sz="4400" spc="-1" strike="noStrike">
               <a:latin typeface="Arial"/>
             </a:endParaRPr>
           </a:p>
@@ -1424,7 +1424,7 @@
             <a:spLocks noGrp="1"/>
           </p:cNvSpPr>
           <p:nvPr>
-            <p:ph type="ftr" idx="2"/>
+            <p:ph type="ftr" idx="1"/>
           </p:nvPr>
         </p:nvSpPr>
         <p:spPr/>
@@ -1444,14 +1444,14 @@
             <a:spLocks noGrp="1"/>
           </p:cNvSpPr>
           <p:nvPr>
-            <p:ph type="sldNum" idx="3"/>
+            <p:ph type="sldNum" idx="2"/>
           </p:nvPr>
         </p:nvSpPr>
         <p:spPr/>
         <p:txBody>
           <a:bodyPr/>
           <a:p>
-            <a:fld id="{B14D659D-03C7-4802-9D43-C7B842E0E5F7}" type="slidenum">
+            <a:fld id="{7D327FC0-1EF9-4D56-BB83-3A84F1B54B84}" type="slidenum">
               <a:t>&lt;#&gt;</a:t>
             </a:fld>
           </a:p>
@@ -1464,7 +1464,7 @@
             <a:spLocks noGrp="1"/>
           </p:cNvSpPr>
           <p:nvPr>
-            <p:ph type="dt" idx="1"/>
+            <p:ph type="dt" idx="3"/>
           </p:nvPr>
         </p:nvSpPr>
         <p:spPr/>
@@ -1513,7 +1513,7 @@
         <p:spPr>
           <a:xfrm>
             <a:off x="450000" y="358560"/>
-            <a:ext cx="8099640" cy="6964920"/>
+            <a:ext cx="8099280" cy="6963480"/>
           </a:xfrm>
           <a:prstGeom prst="rect">
             <a:avLst/>
@@ -1544,7 +1544,7 @@
             <a:spLocks noGrp="1"/>
           </p:cNvSpPr>
           <p:nvPr>
-            <p:ph type="ftr" idx="2"/>
+            <p:ph type="ftr" idx="1"/>
           </p:nvPr>
         </p:nvSpPr>
         <p:spPr/>
@@ -1564,14 +1564,14 @@
             <a:spLocks noGrp="1"/>
           </p:cNvSpPr>
           <p:nvPr>
-            <p:ph type="sldNum" idx="3"/>
+            <p:ph type="sldNum" idx="2"/>
           </p:nvPr>
         </p:nvSpPr>
         <p:spPr/>
         <p:txBody>
           <a:bodyPr/>
           <a:p>
-            <a:fld id="{2B4CEC6F-6227-4FBE-BA65-0AB65E78AE1C}" type="slidenum">
+            <a:fld id="{F7A5F95C-37F1-4343-9E63-BCDF5C558E0C}" type="slidenum">
               <a:t>&lt;#&gt;</a:t>
             </a:fld>
           </a:p>
@@ -1584,7 +1584,7 @@
             <a:spLocks noGrp="1"/>
           </p:cNvSpPr>
           <p:nvPr>
-            <p:ph type="dt" idx="1"/>
+            <p:ph type="dt" idx="3"/>
           </p:nvPr>
         </p:nvSpPr>
         <p:spPr/>
@@ -1633,7 +1633,7 @@
         <p:spPr>
           <a:xfrm>
             <a:off x="450000" y="358560"/>
-            <a:ext cx="8099640" cy="1502280"/>
+            <a:ext cx="8099280" cy="1501920"/>
           </a:xfrm>
           <a:prstGeom prst="rect">
             <a:avLst/>
@@ -1651,7 +1651,7 @@
             <a:pPr algn="ctr">
               <a:buNone/>
             </a:pPr>
-            <a:endParaRPr b="0" lang="en-GB" sz="6980" spc="-1" strike="noStrike">
+            <a:endParaRPr b="0" lang="en-GB" sz="4400" spc="-1" strike="noStrike">
               <a:latin typeface="Arial"/>
             </a:endParaRPr>
           </a:p>
@@ -1669,7 +1669,7 @@
         </p:nvSpPr>
         <p:spPr>
           <a:xfrm>
-            <a:off x="450000" y="2105640"/>
+            <a:off x="449640" y="2105640"/>
             <a:ext cx="3952440" cy="2489400"/>
           </a:xfrm>
           <a:prstGeom prst="rect">
@@ -1685,7 +1685,7 @@
             <a:normAutofit/>
           </a:bodyPr>
           <a:p>
-            <a:endParaRPr b="0" lang="en-GB" sz="5080" spc="-1" strike="noStrike">
+            <a:endParaRPr b="0" lang="en-GB" sz="3200" spc="-1" strike="noStrike">
               <a:latin typeface="Arial"/>
             </a:endParaRPr>
           </a:p>
@@ -1703,7 +1703,7 @@
         </p:nvSpPr>
         <p:spPr>
           <a:xfrm>
-            <a:off x="4600440" y="2105640"/>
+            <a:off x="4600080" y="2105640"/>
             <a:ext cx="3952440" cy="5219280"/>
           </a:xfrm>
           <a:prstGeom prst="rect">
@@ -1719,7 +1719,7 @@
             <a:normAutofit/>
           </a:bodyPr>
           <a:p>
-            <a:endParaRPr b="0" lang="en-GB" sz="5080" spc="-1" strike="noStrike">
+            <a:endParaRPr b="0" lang="en-GB" sz="3200" spc="-1" strike="noStrike">
               <a:latin typeface="Arial"/>
             </a:endParaRPr>
           </a:p>
@@ -1737,7 +1737,7 @@
         </p:nvSpPr>
         <p:spPr>
           <a:xfrm>
-            <a:off x="450000" y="4831920"/>
+            <a:off x="449640" y="4831920"/>
             <a:ext cx="3952440" cy="2489400"/>
           </a:xfrm>
           <a:prstGeom prst="rect">
@@ -1753,7 +1753,7 @@
             <a:normAutofit/>
           </a:bodyPr>
           <a:p>
-            <a:endParaRPr b="0" lang="en-GB" sz="5080" spc="-1" strike="noStrike">
+            <a:endParaRPr b="0" lang="en-GB" sz="3200" spc="-1" strike="noStrike">
               <a:latin typeface="Arial"/>
             </a:endParaRPr>
           </a:p>
@@ -1766,7 +1766,7 @@
             <a:spLocks noGrp="1"/>
           </p:cNvSpPr>
           <p:nvPr>
-            <p:ph type="ftr" idx="2"/>
+            <p:ph type="ftr" idx="1"/>
           </p:nvPr>
         </p:nvSpPr>
         <p:spPr/>
@@ -1786,14 +1786,14 @@
             <a:spLocks noGrp="1"/>
           </p:cNvSpPr>
           <p:nvPr>
-            <p:ph type="sldNum" idx="3"/>
+            <p:ph type="sldNum" idx="2"/>
           </p:nvPr>
         </p:nvSpPr>
         <p:spPr/>
         <p:txBody>
           <a:bodyPr/>
           <a:p>
-            <a:fld id="{70C70ACD-67E8-439E-A084-B9CEDF86D631}" type="slidenum">
+            <a:fld id="{1E6170AF-7915-4D05-AB70-24FF731A62A4}" type="slidenum">
               <a:t>&lt;#&gt;</a:t>
             </a:fld>
           </a:p>
@@ -1806,7 +1806,7 @@
             <a:spLocks noGrp="1"/>
           </p:cNvSpPr>
           <p:nvPr>
-            <p:ph type="dt" idx="1"/>
+            <p:ph type="dt" idx="3"/>
           </p:nvPr>
         </p:nvSpPr>
         <p:spPr/>
@@ -1855,7 +1855,7 @@
         <p:spPr>
           <a:xfrm>
             <a:off x="450000" y="358560"/>
-            <a:ext cx="8099640" cy="1502280"/>
+            <a:ext cx="8099280" cy="1501920"/>
           </a:xfrm>
           <a:prstGeom prst="rect">
             <a:avLst/>
@@ -1873,7 +1873,7 @@
             <a:pPr algn="ctr">
               <a:buNone/>
             </a:pPr>
-            <a:endParaRPr b="0" lang="en-GB" sz="6980" spc="-1" strike="noStrike">
+            <a:endParaRPr b="0" lang="en-GB" sz="4400" spc="-1" strike="noStrike">
               <a:latin typeface="Arial"/>
             </a:endParaRPr>
           </a:p>
@@ -1891,7 +1891,7 @@
         </p:nvSpPr>
         <p:spPr>
           <a:xfrm>
-            <a:off x="450000" y="2105640"/>
+            <a:off x="449640" y="2105640"/>
             <a:ext cx="3952440" cy="5219280"/>
           </a:xfrm>
           <a:prstGeom prst="rect">
@@ -1907,7 +1907,7 @@
             <a:normAutofit/>
           </a:bodyPr>
           <a:p>
-            <a:endParaRPr b="0" lang="en-GB" sz="5080" spc="-1" strike="noStrike">
+            <a:endParaRPr b="0" lang="en-GB" sz="3200" spc="-1" strike="noStrike">
               <a:latin typeface="Arial"/>
             </a:endParaRPr>
           </a:p>
@@ -1925,7 +1925,7 @@
         </p:nvSpPr>
         <p:spPr>
           <a:xfrm>
-            <a:off x="4600440" y="2105640"/>
+            <a:off x="4600080" y="2105640"/>
             <a:ext cx="3952440" cy="2489400"/>
           </a:xfrm>
           <a:prstGeom prst="rect">
@@ -1941,7 +1941,7 @@
             <a:normAutofit/>
           </a:bodyPr>
           <a:p>
-            <a:endParaRPr b="0" lang="en-GB" sz="5080" spc="-1" strike="noStrike">
+            <a:endParaRPr b="0" lang="en-GB" sz="3200" spc="-1" strike="noStrike">
               <a:latin typeface="Arial"/>
             </a:endParaRPr>
           </a:p>
@@ -1959,7 +1959,7 @@
         </p:nvSpPr>
         <p:spPr>
           <a:xfrm>
-            <a:off x="4600440" y="4831920"/>
+            <a:off x="4600080" y="4831920"/>
             <a:ext cx="3952440" cy="2489400"/>
           </a:xfrm>
           <a:prstGeom prst="rect">
@@ -1975,7 +1975,7 @@
             <a:normAutofit/>
           </a:bodyPr>
           <a:p>
-            <a:endParaRPr b="0" lang="en-GB" sz="5080" spc="-1" strike="noStrike">
+            <a:endParaRPr b="0" lang="en-GB" sz="3200" spc="-1" strike="noStrike">
               <a:latin typeface="Arial"/>
             </a:endParaRPr>
           </a:p>
@@ -1988,7 +1988,7 @@
             <a:spLocks noGrp="1"/>
           </p:cNvSpPr>
           <p:nvPr>
-            <p:ph type="ftr" idx="2"/>
+            <p:ph type="ftr" idx="1"/>
           </p:nvPr>
         </p:nvSpPr>
         <p:spPr/>
@@ -2008,14 +2008,14 @@
             <a:spLocks noGrp="1"/>
           </p:cNvSpPr>
           <p:nvPr>
-            <p:ph type="sldNum" idx="3"/>
+            <p:ph type="sldNum" idx="2"/>
           </p:nvPr>
         </p:nvSpPr>
         <p:spPr/>
         <p:txBody>
           <a:bodyPr/>
           <a:p>
-            <a:fld id="{491D4DA5-CDF9-4059-922A-7C7825E5C34F}" type="slidenum">
+            <a:fld id="{1588A836-24F2-4A44-982F-9FEBE1C622D1}" type="slidenum">
               <a:t>&lt;#&gt;</a:t>
             </a:fld>
           </a:p>
@@ -2028,7 +2028,7 @@
             <a:spLocks noGrp="1"/>
           </p:cNvSpPr>
           <p:nvPr>
-            <p:ph type="dt" idx="1"/>
+            <p:ph type="dt" idx="3"/>
           </p:nvPr>
         </p:nvSpPr>
         <p:spPr/>
@@ -2077,7 +2077,7 @@
         <p:spPr>
           <a:xfrm>
             <a:off x="450000" y="358560"/>
-            <a:ext cx="8099640" cy="1502280"/>
+            <a:ext cx="8099280" cy="1501920"/>
           </a:xfrm>
           <a:prstGeom prst="rect">
             <a:avLst/>
@@ -2095,7 +2095,7 @@
             <a:pPr algn="ctr">
               <a:buNone/>
             </a:pPr>
-            <a:endParaRPr b="0" lang="en-GB" sz="6980" spc="-1" strike="noStrike">
+            <a:endParaRPr b="0" lang="en-GB" sz="4400" spc="-1" strike="noStrike">
               <a:latin typeface="Arial"/>
             </a:endParaRPr>
           </a:p>
@@ -2113,7 +2113,7 @@
         </p:nvSpPr>
         <p:spPr>
           <a:xfrm>
-            <a:off x="450000" y="2105640"/>
+            <a:off x="449640" y="2105640"/>
             <a:ext cx="3952440" cy="2489400"/>
           </a:xfrm>
           <a:prstGeom prst="rect">
@@ -2129,7 +2129,7 @@
             <a:normAutofit/>
           </a:bodyPr>
           <a:p>
-            <a:endParaRPr b="0" lang="en-GB" sz="5080" spc="-1" strike="noStrike">
+            <a:endParaRPr b="0" lang="en-GB" sz="3200" spc="-1" strike="noStrike">
               <a:latin typeface="Arial"/>
             </a:endParaRPr>
           </a:p>
@@ -2147,7 +2147,7 @@
         </p:nvSpPr>
         <p:spPr>
           <a:xfrm>
-            <a:off x="4600440" y="2105640"/>
+            <a:off x="4600080" y="2105640"/>
             <a:ext cx="3952440" cy="2489400"/>
           </a:xfrm>
           <a:prstGeom prst="rect">
@@ -2163,7 +2163,7 @@
             <a:normAutofit/>
           </a:bodyPr>
           <a:p>
-            <a:endParaRPr b="0" lang="en-GB" sz="5080" spc="-1" strike="noStrike">
+            <a:endParaRPr b="0" lang="en-GB" sz="3200" spc="-1" strike="noStrike">
               <a:latin typeface="Arial"/>
             </a:endParaRPr>
           </a:p>
@@ -2181,8 +2181,8 @@
         </p:nvSpPr>
         <p:spPr>
           <a:xfrm>
-            <a:off x="450000" y="4831920"/>
-            <a:ext cx="8099640" cy="2489400"/>
+            <a:off x="449640" y="4831920"/>
+            <a:ext cx="8099280" cy="2489400"/>
           </a:xfrm>
           <a:prstGeom prst="rect">
             <a:avLst/>
@@ -2197,7 +2197,7 @@
             <a:normAutofit/>
           </a:bodyPr>
           <a:p>
-            <a:endParaRPr b="0" lang="en-GB" sz="5080" spc="-1" strike="noStrike">
+            <a:endParaRPr b="0" lang="en-GB" sz="3200" spc="-1" strike="noStrike">
               <a:latin typeface="Arial"/>
             </a:endParaRPr>
           </a:p>
@@ -2210,7 +2210,7 @@
             <a:spLocks noGrp="1"/>
           </p:cNvSpPr>
           <p:nvPr>
-            <p:ph type="ftr" idx="2"/>
+            <p:ph type="ftr" idx="1"/>
           </p:nvPr>
         </p:nvSpPr>
         <p:spPr/>
@@ -2230,14 +2230,14 @@
             <a:spLocks noGrp="1"/>
           </p:cNvSpPr>
           <p:nvPr>
-            <p:ph type="sldNum" idx="3"/>
+            <p:ph type="sldNum" idx="2"/>
           </p:nvPr>
         </p:nvSpPr>
         <p:spPr/>
         <p:txBody>
           <a:bodyPr/>
           <a:p>
-            <a:fld id="{8A9E8437-CAFF-4C9A-A4C1-CD1BA7C87794}" type="slidenum">
+            <a:fld id="{65FFCB6A-84D2-40ED-907E-3845411F663D}" type="slidenum">
               <a:t>&lt;#&gt;</a:t>
             </a:fld>
           </a:p>
@@ -2250,7 +2250,7 @@
             <a:spLocks noGrp="1"/>
           </p:cNvSpPr>
           <p:nvPr>
-            <p:ph type="dt" idx="1"/>
+            <p:ph type="dt" idx="3"/>
           </p:nvPr>
         </p:nvSpPr>
         <p:spPr/>
@@ -2299,7 +2299,7 @@
         <p:spPr>
           <a:xfrm>
             <a:off x="450000" y="358560"/>
-            <a:ext cx="8099640" cy="1502280"/>
+            <a:ext cx="8099280" cy="1501920"/>
           </a:xfrm>
           <a:prstGeom prst="rect">
             <a:avLst/>
@@ -2314,35 +2314,293 @@
             <a:noAutofit/>
           </a:bodyPr>
           <a:p>
+            <a:r>
+              <a:rPr b="0" lang="en-GB" sz="1800" spc="-1" strike="noStrike">
+                <a:latin typeface="Arial"/>
+              </a:rPr>
+              <a:t>C</a:t>
+            </a:r>
+            <a:r>
+              <a:rPr b="0" lang="en-GB" sz="1800" spc="-1" strike="noStrike">
+                <a:latin typeface="Arial"/>
+              </a:rPr>
+              <a:t>l</a:t>
+            </a:r>
+            <a:r>
+              <a:rPr b="0" lang="en-GB" sz="1800" spc="-1" strike="noStrike">
+                <a:latin typeface="Arial"/>
+              </a:rPr>
+              <a:t>i</a:t>
+            </a:r>
+            <a:r>
+              <a:rPr b="0" lang="en-GB" sz="1800" spc="-1" strike="noStrike">
+                <a:latin typeface="Arial"/>
+              </a:rPr>
+              <a:t>c</a:t>
+            </a:r>
+            <a:r>
+              <a:rPr b="0" lang="en-GB" sz="1800" spc="-1" strike="noStrike">
+                <a:latin typeface="Arial"/>
+              </a:rPr>
+              <a:t>k</a:t>
+            </a:r>
+            <a:r>
+              <a:rPr b="0" lang="en-GB" sz="1800" spc="-1" strike="noStrike">
+                <a:latin typeface="Arial"/>
+              </a:rPr>
+              <a:t> </a:t>
+            </a:r>
+            <a:r>
+              <a:rPr b="0" lang="en-GB" sz="1800" spc="-1" strike="noStrike">
+                <a:latin typeface="Arial"/>
+              </a:rPr>
+              <a:t>t</a:t>
+            </a:r>
+            <a:r>
+              <a:rPr b="0" lang="en-GB" sz="1800" spc="-1" strike="noStrike">
+                <a:latin typeface="Arial"/>
+              </a:rPr>
+              <a:t>o</a:t>
+            </a:r>
+            <a:r>
+              <a:rPr b="0" lang="en-GB" sz="1800" spc="-1" strike="noStrike">
+                <a:latin typeface="Arial"/>
+              </a:rPr>
+              <a:t> </a:t>
+            </a:r>
+            <a:r>
+              <a:rPr b="0" lang="en-GB" sz="1800" spc="-1" strike="noStrike">
+                <a:latin typeface="Arial"/>
+              </a:rPr>
+              <a:t>e</a:t>
+            </a:r>
+            <a:r>
+              <a:rPr b="0" lang="en-GB" sz="1800" spc="-1" strike="noStrike">
+                <a:latin typeface="Arial"/>
+              </a:rPr>
+              <a:t>d</a:t>
+            </a:r>
+            <a:r>
+              <a:rPr b="0" lang="en-GB" sz="1800" spc="-1" strike="noStrike">
+                <a:latin typeface="Arial"/>
+              </a:rPr>
+              <a:t>i</a:t>
+            </a:r>
+            <a:r>
+              <a:rPr b="0" lang="en-GB" sz="1800" spc="-1" strike="noStrike">
+                <a:latin typeface="Arial"/>
+              </a:rPr>
+              <a:t>t</a:t>
+            </a:r>
+            <a:r>
+              <a:rPr b="0" lang="en-GB" sz="1800" spc="-1" strike="noStrike">
+                <a:latin typeface="Arial"/>
+              </a:rPr>
+              <a:t> </a:t>
+            </a:r>
+            <a:r>
+              <a:rPr b="0" lang="en-GB" sz="1800" spc="-1" strike="noStrike">
+                <a:latin typeface="Arial"/>
+              </a:rPr>
+              <a:t>t</a:t>
+            </a:r>
+            <a:r>
+              <a:rPr b="0" lang="en-GB" sz="1800" spc="-1" strike="noStrike">
+                <a:latin typeface="Arial"/>
+              </a:rPr>
+              <a:t>h</a:t>
+            </a:r>
+            <a:r>
+              <a:rPr b="0" lang="en-GB" sz="1800" spc="-1" strike="noStrike">
+                <a:latin typeface="Arial"/>
+              </a:rPr>
+              <a:t>e</a:t>
+            </a:r>
+            <a:r>
+              <a:rPr b="0" lang="en-GB" sz="1800" spc="-1" strike="noStrike">
+                <a:latin typeface="Arial"/>
+              </a:rPr>
+              <a:t> </a:t>
+            </a:r>
+            <a:r>
+              <a:rPr b="0" lang="en-GB" sz="1800" spc="-1" strike="noStrike">
+                <a:latin typeface="Arial"/>
+              </a:rPr>
+              <a:t>t</a:t>
+            </a:r>
+            <a:r>
+              <a:rPr b="0" lang="en-GB" sz="1800" spc="-1" strike="noStrike">
+                <a:latin typeface="Arial"/>
+              </a:rPr>
+              <a:t>i</a:t>
+            </a:r>
+            <a:r>
+              <a:rPr b="0" lang="en-GB" sz="1800" spc="-1" strike="noStrike">
+                <a:latin typeface="Arial"/>
+              </a:rPr>
+              <a:t>t</a:t>
+            </a:r>
+            <a:r>
+              <a:rPr b="0" lang="en-GB" sz="1800" spc="-1" strike="noStrike">
+                <a:latin typeface="Arial"/>
+              </a:rPr>
+              <a:t>l</a:t>
+            </a:r>
+            <a:r>
+              <a:rPr b="0" lang="en-GB" sz="1800" spc="-1" strike="noStrike">
+                <a:latin typeface="Arial"/>
+              </a:rPr>
+              <a:t>e</a:t>
+            </a:r>
+            <a:r>
+              <a:rPr b="0" lang="en-GB" sz="1800" spc="-1" strike="noStrike">
+                <a:latin typeface="Arial"/>
+              </a:rPr>
+              <a:t> </a:t>
+            </a:r>
+            <a:r>
+              <a:rPr b="0" lang="en-GB" sz="1800" spc="-1" strike="noStrike">
+                <a:latin typeface="Arial"/>
+              </a:rPr>
+              <a:t>t</a:t>
+            </a:r>
+            <a:r>
+              <a:rPr b="0" lang="en-GB" sz="1800" spc="-1" strike="noStrike">
+                <a:latin typeface="Arial"/>
+              </a:rPr>
+              <a:t>e</a:t>
+            </a:r>
+            <a:r>
+              <a:rPr b="0" lang="en-GB" sz="1800" spc="-1" strike="noStrike">
+                <a:latin typeface="Arial"/>
+              </a:rPr>
+              <a:t>x</a:t>
+            </a:r>
+            <a:r>
+              <a:rPr b="0" lang="en-GB" sz="1800" spc="-1" strike="noStrike">
+                <a:latin typeface="Arial"/>
+              </a:rPr>
+              <a:t>t</a:t>
+            </a:r>
+            <a:r>
+              <a:rPr b="0" lang="en-GB" sz="1800" spc="-1" strike="noStrike">
+                <a:latin typeface="Arial"/>
+              </a:rPr>
+              <a:t> </a:t>
+            </a:r>
+            <a:r>
+              <a:rPr b="0" lang="en-GB" sz="1800" spc="-1" strike="noStrike">
+                <a:latin typeface="Arial"/>
+              </a:rPr>
+              <a:t>f</a:t>
+            </a:r>
+            <a:r>
+              <a:rPr b="0" lang="en-GB" sz="1800" spc="-1" strike="noStrike">
+                <a:latin typeface="Arial"/>
+              </a:rPr>
+              <a:t>o</a:t>
+            </a:r>
+            <a:r>
+              <a:rPr b="0" lang="en-GB" sz="1800" spc="-1" strike="noStrike">
+                <a:latin typeface="Arial"/>
+              </a:rPr>
+              <a:t>r</a:t>
+            </a:r>
+            <a:r>
+              <a:rPr b="0" lang="en-GB" sz="1800" spc="-1" strike="noStrike">
+                <a:latin typeface="Arial"/>
+              </a:rPr>
+              <a:t>m</a:t>
+            </a:r>
+            <a:r>
+              <a:rPr b="0" lang="en-GB" sz="1800" spc="-1" strike="noStrike">
+                <a:latin typeface="Arial"/>
+              </a:rPr>
+              <a:t>a</a:t>
+            </a:r>
+            <a:r>
+              <a:rPr b="0" lang="en-GB" sz="1800" spc="-1" strike="noStrike">
+                <a:latin typeface="Arial"/>
+              </a:rPr>
+              <a:t>t</a:t>
+            </a:r>
+            <a:endParaRPr b="0" lang="en-GB" sz="1800" spc="-1" strike="noStrike">
+              <a:latin typeface="Arial"/>
+            </a:endParaRPr>
+          </a:p>
+        </p:txBody>
+      </p:sp>
+      <p:sp>
+        <p:nvSpPr>
+          <p:cNvPr id="1" name="PlaceHolder 2"/>
+          <p:cNvSpPr>
+            <a:spLocks noGrp="1"/>
+          </p:cNvSpPr>
+          <p:nvPr>
+            <p:ph type="ftr" idx="1"/>
+          </p:nvPr>
+        </p:nvSpPr>
+        <p:spPr>
+          <a:xfrm>
+            <a:off x="3078000" y="8198640"/>
+            <a:ext cx="2852280" cy="619560"/>
+          </a:xfrm>
+          <a:prstGeom prst="rect">
+            <a:avLst/>
+          </a:prstGeom>
+          <a:noFill/>
+          <a:ln w="0">
+            <a:noFill/>
+          </a:ln>
+        </p:spPr>
+        <p:txBody>
+          <a:bodyPr lIns="0" rIns="0" tIns="0" bIns="0" anchor="t">
+            <a:noAutofit/>
+          </a:bodyPr>
+          <a:lstStyle>
+            <a:lvl1pPr algn="ctr">
+              <a:lnSpc>
+                <a:spcPct val="100000"/>
+              </a:lnSpc>
+              <a:buNone/>
+              <a:defRPr b="0" lang="en-GB" sz="1400" spc="-1" strike="noStrike">
+                <a:latin typeface="Times New Roman"/>
+              </a:defRPr>
+            </a:lvl1pPr>
+          </a:lstStyle>
+          <a:p>
             <a:pPr algn="ctr">
+              <a:lnSpc>
+                <a:spcPct val="100000"/>
+              </a:lnSpc>
               <a:buNone/>
             </a:pPr>
             <a:r>
-              <a:rPr b="0" lang="en-GB" sz="6980" spc="-1" strike="noStrike">
-                <a:latin typeface="Arial"/>
-              </a:rPr>
-              <a:t>Click to edit the title text format</a:t>
-            </a:r>
-            <a:endParaRPr b="0" lang="en-GB" sz="6980" spc="-1" strike="noStrike">
-              <a:latin typeface="Arial"/>
-            </a:endParaRPr>
-          </a:p>
-        </p:txBody>
-      </p:sp>
-      <p:sp>
-        <p:nvSpPr>
-          <p:cNvPr id="1" name="PlaceHolder 2"/>
-          <p:cNvSpPr>
-            <a:spLocks noGrp="1"/>
-          </p:cNvSpPr>
-          <p:nvPr>
-            <p:ph type="body"/>
-          </p:nvPr>
-        </p:nvSpPr>
-        <p:spPr>
-          <a:xfrm>
-            <a:off x="450000" y="2105640"/>
-            <a:ext cx="8099640" cy="5219280"/>
+              <a:rPr b="0" lang="en-GB" sz="1400" spc="-1" strike="noStrike">
+                <a:latin typeface="Times New Roman"/>
+              </a:rPr>
+              <a:t>&lt;footer&gt;</a:t>
+            </a:r>
+            <a:endParaRPr b="0" lang="en-GB" sz="1400" spc="-1" strike="noStrike">
+              <a:latin typeface="Times New Roman"/>
+            </a:endParaRPr>
+          </a:p>
+        </p:txBody>
+      </p:sp>
+      <p:sp>
+        <p:nvSpPr>
+          <p:cNvPr id="2" name="PlaceHolder 3"/>
+          <p:cNvSpPr>
+            <a:spLocks noGrp="1"/>
+          </p:cNvSpPr>
+          <p:nvPr>
+            <p:ph type="sldNum" idx="2"/>
+          </p:nvPr>
+        </p:nvSpPr>
+        <p:spPr>
+          <a:xfrm>
+            <a:off x="6453000" y="8198640"/>
+            <a:ext cx="2096280" cy="619560"/>
           </a:xfrm>
           <a:prstGeom prst="rect">
             <a:avLst/>
@@ -2354,178 +2612,52 @@
         </p:spPr>
         <p:txBody>
           <a:bodyPr lIns="0" rIns="0" tIns="0" bIns="0" anchor="t">
-            <a:normAutofit/>
+            <a:noAutofit/>
           </a:bodyPr>
-          <a:p>
-            <a:pPr marL="432000" indent="-324000">
-              <a:spcBef>
-                <a:spcPts val="2248"/>
-              </a:spcBef>
-              <a:buClr>
-                <a:srgbClr val="000000"/>
-              </a:buClr>
-              <a:buSzPct val="45000"/>
-              <a:buFont typeface="Wingdings" charset="2"/>
-              <a:buChar char=""/>
+          <a:lstStyle>
+            <a:lvl1pPr algn="r">
+              <a:lnSpc>
+                <a:spcPct val="100000"/>
+              </a:lnSpc>
+              <a:buNone/>
+              <a:defRPr b="0" lang="en-GB" sz="1400" spc="-1" strike="noStrike">
+                <a:latin typeface="Times New Roman"/>
+              </a:defRPr>
+            </a:lvl1pPr>
+          </a:lstStyle>
+          <a:p>
+            <a:pPr algn="r">
+              <a:lnSpc>
+                <a:spcPct val="100000"/>
+              </a:lnSpc>
+              <a:buNone/>
             </a:pPr>
-            <a:r>
-              <a:rPr b="0" lang="en-GB" sz="5080" spc="-1" strike="noStrike">
-                <a:latin typeface="Arial"/>
-              </a:rPr>
-              <a:t>Click to edit the outline text format</a:t>
-            </a:r>
-            <a:endParaRPr b="0" lang="en-GB" sz="5080" spc="-1" strike="noStrike">
-              <a:latin typeface="Arial"/>
-            </a:endParaRPr>
-          </a:p>
-          <a:p>
-            <a:pPr lvl="1" marL="864000" indent="-324000">
-              <a:spcBef>
-                <a:spcPts val="1797"/>
-              </a:spcBef>
-              <a:buClr>
-                <a:srgbClr val="000000"/>
-              </a:buClr>
-              <a:buSzPct val="75000"/>
-              <a:buFont typeface="Symbol" charset="2"/>
-              <a:buChar char=""/>
-            </a:pPr>
-            <a:r>
-              <a:rPr b="0" lang="en-GB" sz="4440" spc="-1" strike="noStrike">
-                <a:latin typeface="Arial"/>
-              </a:rPr>
-              <a:t>Second Outline Level</a:t>
-            </a:r>
-            <a:endParaRPr b="0" lang="en-GB" sz="4440" spc="-1" strike="noStrike">
-              <a:latin typeface="Arial"/>
-            </a:endParaRPr>
-          </a:p>
-          <a:p>
-            <a:pPr lvl="2" marL="1296000" indent="-288000">
-              <a:spcBef>
-                <a:spcPts val="1349"/>
-              </a:spcBef>
-              <a:buClr>
-                <a:srgbClr val="000000"/>
-              </a:buClr>
-              <a:buSzPct val="45000"/>
-              <a:buFont typeface="Wingdings" charset="2"/>
-              <a:buChar char=""/>
-            </a:pPr>
-            <a:r>
-              <a:rPr b="0" lang="en-GB" sz="3809" spc="-1" strike="noStrike">
-                <a:latin typeface="Arial"/>
-              </a:rPr>
-              <a:t>Third Outline Level</a:t>
-            </a:r>
-            <a:endParaRPr b="0" lang="en-GB" sz="3809" spc="-1" strike="noStrike">
-              <a:latin typeface="Arial"/>
-            </a:endParaRPr>
-          </a:p>
-          <a:p>
-            <a:pPr lvl="3" marL="1728000" indent="-216000">
-              <a:spcBef>
-                <a:spcPts val="899"/>
-              </a:spcBef>
-              <a:buClr>
-                <a:srgbClr val="000000"/>
-              </a:buClr>
-              <a:buSzPct val="75000"/>
-              <a:buFont typeface="Symbol" charset="2"/>
-              <a:buChar char=""/>
-            </a:pPr>
-            <a:r>
-              <a:rPr b="0" lang="en-GB" sz="3170" spc="-1" strike="noStrike">
-                <a:latin typeface="Arial"/>
-              </a:rPr>
-              <a:t>Fourth Outline Level</a:t>
-            </a:r>
-            <a:endParaRPr b="0" lang="en-GB" sz="3170" spc="-1" strike="noStrike">
-              <a:latin typeface="Arial"/>
-            </a:endParaRPr>
-          </a:p>
-          <a:p>
-            <a:pPr lvl="4" marL="2160000" indent="-216000">
-              <a:spcBef>
-                <a:spcPts val="448"/>
-              </a:spcBef>
-              <a:buClr>
-                <a:srgbClr val="000000"/>
-              </a:buClr>
-              <a:buSzPct val="45000"/>
-              <a:buFont typeface="Wingdings" charset="2"/>
-              <a:buChar char=""/>
-            </a:pPr>
-            <a:r>
-              <a:rPr b="0" lang="en-GB" sz="3170" spc="-1" strike="noStrike">
-                <a:latin typeface="Arial"/>
-              </a:rPr>
-              <a:t>Fifth Outline Level</a:t>
-            </a:r>
-            <a:endParaRPr b="0" lang="en-GB" sz="3170" spc="-1" strike="noStrike">
-              <a:latin typeface="Arial"/>
-            </a:endParaRPr>
-          </a:p>
-          <a:p>
-            <a:pPr lvl="5" marL="2592000" indent="-216000">
-              <a:spcBef>
-                <a:spcPts val="448"/>
-              </a:spcBef>
-              <a:buClr>
-                <a:srgbClr val="000000"/>
-              </a:buClr>
-              <a:buSzPct val="45000"/>
-              <a:buFont typeface="Wingdings" charset="2"/>
-              <a:buChar char=""/>
-            </a:pPr>
-            <a:r>
-              <a:rPr b="0" lang="en-GB" sz="3170" spc="-1" strike="noStrike">
-                <a:latin typeface="Arial"/>
-              </a:rPr>
-              <a:t>Sixth Outline Level</a:t>
-            </a:r>
-            <a:endParaRPr b="0" lang="en-GB" sz="3170" spc="-1" strike="noStrike">
-              <a:latin typeface="Arial"/>
-            </a:endParaRPr>
-          </a:p>
-          <a:p>
-            <a:pPr lvl="6" marL="3024000" indent="-216000">
-              <a:spcBef>
-                <a:spcPts val="448"/>
-              </a:spcBef>
-              <a:buClr>
-                <a:srgbClr val="000000"/>
-              </a:buClr>
-              <a:buSzPct val="45000"/>
-              <a:buFont typeface="Wingdings" charset="2"/>
-              <a:buChar char=""/>
-            </a:pPr>
-            <a:r>
-              <a:rPr b="0" lang="en-GB" sz="3170" spc="-1" strike="noStrike">
-                <a:latin typeface="Arial"/>
-              </a:rPr>
-              <a:t>Seventh Outline Level</a:t>
-            </a:r>
-            <a:endParaRPr b="0" lang="en-GB" sz="3170" spc="-1" strike="noStrike">
-              <a:latin typeface="Arial"/>
-            </a:endParaRPr>
-          </a:p>
-        </p:txBody>
-      </p:sp>
-      <p:sp>
-        <p:nvSpPr>
-          <p:cNvPr id="2" name="PlaceHolder 3"/>
-          <p:cNvSpPr>
-            <a:spLocks noGrp="1"/>
-          </p:cNvSpPr>
-          <p:nvPr>
-            <p:ph type="dt" idx="1"/>
+            <a:fld id="{676322E3-E176-42A8-ACDF-4A12FED72077}" type="slidenum">
+              <a:rPr b="0" lang="en-GB" sz="1400" spc="-1" strike="noStrike">
+                <a:latin typeface="Times New Roman"/>
+              </a:rPr>
+              <a:t>&lt;number&gt;</a:t>
+            </a:fld>
+            <a:endParaRPr b="0" lang="en-GB" sz="1400" spc="-1" strike="noStrike">
+              <a:latin typeface="Times New Roman"/>
+            </a:endParaRPr>
+          </a:p>
+        </p:txBody>
+      </p:sp>
+      <p:sp>
+        <p:nvSpPr>
+          <p:cNvPr id="3" name="PlaceHolder 4"/>
+          <p:cNvSpPr>
+            <a:spLocks noGrp="1"/>
+          </p:cNvSpPr>
+          <p:nvPr>
+            <p:ph type="dt" idx="3"/>
           </p:nvPr>
         </p:nvSpPr>
         <p:spPr>
           <a:xfrm>
             <a:off x="450000" y="8198640"/>
-            <a:ext cx="2096640" cy="619920"/>
+            <a:ext cx="2096280" cy="619560"/>
           </a:xfrm>
           <a:prstGeom prst="rect">
             <a:avLst/>
@@ -2561,18 +2693,18 @@
       </p:sp>
       <p:sp>
         <p:nvSpPr>
-          <p:cNvPr id="3" name="PlaceHolder 4"/>
-          <p:cNvSpPr>
-            <a:spLocks noGrp="1"/>
-          </p:cNvSpPr>
-          <p:nvPr>
-            <p:ph type="ftr" idx="2"/>
-          </p:nvPr>
-        </p:nvSpPr>
-        <p:spPr>
-          <a:xfrm>
-            <a:off x="3078000" y="8198640"/>
-            <a:ext cx="2852640" cy="619920"/>
+          <p:cNvPr id="4" name="PlaceHolder 5"/>
+          <p:cNvSpPr>
+            <a:spLocks noGrp="1"/>
+          </p:cNvSpPr>
+          <p:nvPr>
+            <p:ph type="body"/>
+          </p:nvPr>
+        </p:nvSpPr>
+        <p:spPr>
+          <a:xfrm>
+            <a:off x="449640" y="2105640"/>
+            <a:ext cx="8099280" cy="5219280"/>
           </a:xfrm>
           <a:prstGeom prst="rect">
             <a:avLst/>
@@ -2584,79 +2716,160 @@
         </p:spPr>
         <p:txBody>
           <a:bodyPr lIns="0" rIns="0" tIns="0" bIns="0" anchor="t">
-            <a:noAutofit/>
+            <a:normAutofit/>
           </a:bodyPr>
-          <a:lstStyle>
-            <a:lvl1pPr algn="ctr">
-              <a:buNone/>
-              <a:defRPr b="0" lang="en-GB" sz="1400" spc="-1" strike="noStrike">
-                <a:latin typeface="Times New Roman"/>
-              </a:defRPr>
-            </a:lvl1pPr>
-          </a:lstStyle>
-          <a:p>
-            <a:pPr algn="ctr">
-              <a:buNone/>
+          <a:p>
+            <a:pPr marL="432000" indent="-324000">
+              <a:spcBef>
+                <a:spcPts val="1417"/>
+              </a:spcBef>
+              <a:buClr>
+                <a:srgbClr val="000000"/>
+              </a:buClr>
+              <a:buSzPct val="45000"/>
+              <a:buFont typeface="Wingdings" charset="2"/>
+              <a:buChar char=""/>
             </a:pPr>
             <a:r>
-              <a:rPr b="0" lang="en-GB" sz="1400" spc="-1" strike="noStrike">
-                <a:latin typeface="Times New Roman"/>
-              </a:rPr>
-              <a:t>&lt;footer&gt;</a:t>
-            </a:r>
-            <a:endParaRPr b="0" lang="en-GB" sz="1400" spc="-1" strike="noStrike">
-              <a:latin typeface="Times New Roman"/>
-            </a:endParaRPr>
-          </a:p>
-        </p:txBody>
-      </p:sp>
-      <p:sp>
-        <p:nvSpPr>
-          <p:cNvPr id="4" name="PlaceHolder 5"/>
-          <p:cNvSpPr>
-            <a:spLocks noGrp="1"/>
-          </p:cNvSpPr>
-          <p:nvPr>
-            <p:ph type="sldNum" idx="3"/>
-          </p:nvPr>
-        </p:nvSpPr>
-        <p:spPr>
-          <a:xfrm>
-            <a:off x="6453000" y="8198640"/>
-            <a:ext cx="2096640" cy="619920"/>
-          </a:xfrm>
-          <a:prstGeom prst="rect">
-            <a:avLst/>
-          </a:prstGeom>
-          <a:noFill/>
-          <a:ln w="0">
-            <a:noFill/>
-          </a:ln>
-        </p:spPr>
-        <p:txBody>
-          <a:bodyPr lIns="0" rIns="0" tIns="0" bIns="0" anchor="t">
-            <a:noAutofit/>
-          </a:bodyPr>
-          <a:lstStyle>
-            <a:lvl1pPr algn="r">
-              <a:buNone/>
-              <a:defRPr b="0" lang="en-GB" sz="1400" spc="-1" strike="noStrike">
-                <a:latin typeface="Times New Roman"/>
-              </a:defRPr>
-            </a:lvl1pPr>
-          </a:lstStyle>
-          <a:p>
-            <a:pPr algn="r">
-              <a:buNone/>
+              <a:rPr b="0" lang="en-GB" sz="3200" spc="-1" strike="noStrike">
+                <a:latin typeface="Arial"/>
+              </a:rPr>
+              <a:t>Click to edit the outline text format</a:t>
+            </a:r>
+            <a:endParaRPr b="0" lang="en-GB" sz="3200" spc="-1" strike="noStrike">
+              <a:latin typeface="Arial"/>
+            </a:endParaRPr>
+          </a:p>
+          <a:p>
+            <a:pPr lvl="1" marL="864000" indent="-324000">
+              <a:spcBef>
+                <a:spcPts val="1134"/>
+              </a:spcBef>
+              <a:buClr>
+                <a:srgbClr val="000000"/>
+              </a:buClr>
+              <a:buSzPct val="75000"/>
+              <a:buFont typeface="Symbol" charset="2"/>
+              <a:buChar char=""/>
             </a:pPr>
-            <a:fld id="{9C29E33D-4F4D-4BDF-94BB-1A152C469B77}" type="slidenum">
-              <a:rPr b="0" lang="en-GB" sz="1400" spc="-1" strike="noStrike">
-                <a:latin typeface="Times New Roman"/>
-              </a:rPr>
-              <a:t>&lt;number&gt;</a:t>
-            </a:fld>
-            <a:endParaRPr b="0" lang="en-GB" sz="1400" spc="-1" strike="noStrike">
-              <a:latin typeface="Times New Roman"/>
+            <a:r>
+              <a:rPr b="0" lang="en-GB" sz="2800" spc="-1" strike="noStrike">
+                <a:latin typeface="Arial"/>
+              </a:rPr>
+              <a:t>Second Outline Level</a:t>
+            </a:r>
+            <a:endParaRPr b="0" lang="en-GB" sz="2800" spc="-1" strike="noStrike">
+              <a:latin typeface="Arial"/>
+            </a:endParaRPr>
+          </a:p>
+          <a:p>
+            <a:pPr lvl="2" marL="1296000" indent="-288000">
+              <a:spcBef>
+                <a:spcPts val="850"/>
+              </a:spcBef>
+              <a:buClr>
+                <a:srgbClr val="000000"/>
+              </a:buClr>
+              <a:buSzPct val="45000"/>
+              <a:buFont typeface="Wingdings" charset="2"/>
+              <a:buChar char=""/>
+            </a:pPr>
+            <a:r>
+              <a:rPr b="0" lang="en-GB" sz="2400" spc="-1" strike="noStrike">
+                <a:latin typeface="Arial"/>
+              </a:rPr>
+              <a:t>Third Outline Level</a:t>
+            </a:r>
+            <a:endParaRPr b="0" lang="en-GB" sz="2400" spc="-1" strike="noStrike">
+              <a:latin typeface="Arial"/>
+            </a:endParaRPr>
+          </a:p>
+          <a:p>
+            <a:pPr lvl="3" marL="1728000" indent="-216000">
+              <a:spcBef>
+                <a:spcPts val="567"/>
+              </a:spcBef>
+              <a:buClr>
+                <a:srgbClr val="000000"/>
+              </a:buClr>
+              <a:buSzPct val="75000"/>
+              <a:buFont typeface="Symbol" charset="2"/>
+              <a:buChar char=""/>
+            </a:pPr>
+            <a:r>
+              <a:rPr b="0" lang="en-GB" sz="2000" spc="-1" strike="noStrike">
+                <a:latin typeface="Arial"/>
+              </a:rPr>
+              <a:t>Fourth Outline Level</a:t>
+            </a:r>
+            <a:endParaRPr b="0" lang="en-GB" sz="2000" spc="-1" strike="noStrike">
+              <a:latin typeface="Arial"/>
+            </a:endParaRPr>
+          </a:p>
+          <a:p>
+            <a:pPr lvl="4" marL="2160000" indent="-216000">
+              <a:spcBef>
+                <a:spcPts val="283"/>
+              </a:spcBef>
+              <a:buClr>
+                <a:srgbClr val="000000"/>
+              </a:buClr>
+              <a:buSzPct val="45000"/>
+              <a:buFont typeface="Wingdings" charset="2"/>
+              <a:buChar char=""/>
+            </a:pPr>
+            <a:r>
+              <a:rPr b="0" lang="en-GB" sz="2000" spc="-1" strike="noStrike">
+                <a:latin typeface="Arial"/>
+              </a:rPr>
+              <a:t>Fifth Outline Level</a:t>
+            </a:r>
+            <a:endParaRPr b="0" lang="en-GB" sz="2000" spc="-1" strike="noStrike">
+              <a:latin typeface="Arial"/>
+            </a:endParaRPr>
+          </a:p>
+          <a:p>
+            <a:pPr lvl="5" marL="2592000" indent="-216000">
+              <a:spcBef>
+                <a:spcPts val="283"/>
+              </a:spcBef>
+              <a:buClr>
+                <a:srgbClr val="000000"/>
+              </a:buClr>
+              <a:buSzPct val="45000"/>
+              <a:buFont typeface="Wingdings" charset="2"/>
+              <a:buChar char=""/>
+            </a:pPr>
+            <a:r>
+              <a:rPr b="0" lang="en-GB" sz="2000" spc="-1" strike="noStrike">
+                <a:latin typeface="Arial"/>
+              </a:rPr>
+              <a:t>Sixth Outline Level</a:t>
+            </a:r>
+            <a:endParaRPr b="0" lang="en-GB" sz="2000" spc="-1" strike="noStrike">
+              <a:latin typeface="Arial"/>
+            </a:endParaRPr>
+          </a:p>
+          <a:p>
+            <a:pPr lvl="6" marL="3024000" indent="-216000">
+              <a:spcBef>
+                <a:spcPts val="283"/>
+              </a:spcBef>
+              <a:buClr>
+                <a:srgbClr val="000000"/>
+              </a:buClr>
+              <a:buSzPct val="45000"/>
+              <a:buFont typeface="Wingdings" charset="2"/>
+              <a:buChar char=""/>
+            </a:pPr>
+            <a:r>
+              <a:rPr b="0" lang="en-GB" sz="2000" spc="-1" strike="noStrike">
+                <a:latin typeface="Arial"/>
+              </a:rPr>
+              <a:t>Seventh Outline Level</a:t>
+            </a:r>
+            <a:endParaRPr b="0" lang="en-GB" sz="2000" spc="-1" strike="noStrike">
+              <a:latin typeface="Arial"/>
             </a:endParaRPr>
           </a:p>
         </p:txBody>
@@ -2698,87 +2911,44 @@
           <a:chExt cx="0" cy="0"/>
         </a:xfrm>
       </p:grpSpPr>
-      <p:sp>
-        <p:nvSpPr>
-          <p:cNvPr id="41" name="PlaceHolder 1"/>
-          <p:cNvSpPr>
-            <a:spLocks noGrp="1"/>
-          </p:cNvSpPr>
-          <p:nvPr>
-            <p:ph type="title"/>
-          </p:nvPr>
-        </p:nvSpPr>
-        <p:spPr>
-          <a:xfrm>
-            <a:off x="450000" y="358560"/>
-            <a:ext cx="8099640" cy="1502280"/>
-          </a:xfrm>
-          <a:prstGeom prst="rect">
-            <a:avLst/>
-          </a:prstGeom>
-          <a:noFill/>
-          <a:ln w="0">
-            <a:noFill/>
-          </a:ln>
-        </p:spPr>
-        <p:txBody>
-          <a:bodyPr lIns="0" rIns="0" tIns="0" bIns="0" anchor="ctr">
-            <a:noAutofit/>
-          </a:bodyPr>
-          <a:p>
-            <a:pPr algn="ctr">
-              <a:buNone/>
-            </a:pPr>
-            <a:r>
-              <a:rPr b="0" lang="en-GB" sz="6980" spc="-1" strike="noStrike">
-                <a:latin typeface="Ubuntu"/>
-              </a:rPr>
-              <a:t>Energy</a:t>
-            </a:r>
-            <a:endParaRPr b="0" lang="en-GB" sz="6980" spc="-1" strike="noStrike">
-              <a:latin typeface="Arial"/>
-            </a:endParaRPr>
-          </a:p>
-        </p:txBody>
-      </p:sp>
       <p:grpSp>
         <p:nvGrpSpPr>
-          <p:cNvPr id="42" name=""/>
+          <p:cNvPr id="41" name=""/>
           <p:cNvGrpSpPr/>
           <p:nvPr/>
         </p:nvGrpSpPr>
         <p:grpSpPr>
           <a:xfrm>
-            <a:off x="1260000" y="4140000"/>
-            <a:ext cx="1530360" cy="1260360"/>
-            <a:chOff x="1260000" y="4140000"/>
-            <a:chExt cx="1530360" cy="1260360"/>
+            <a:off x="1259640" y="4140000"/>
+            <a:ext cx="1530360" cy="1260000"/>
+            <a:chOff x="1259640" y="4140000"/>
+            <a:chExt cx="1530360" cy="1260000"/>
           </a:xfrm>
         </p:grpSpPr>
         <p:grpSp>
           <p:nvGrpSpPr>
-            <p:cNvPr id="43" name=""/>
+            <p:cNvPr id="42" name=""/>
             <p:cNvGrpSpPr/>
             <p:nvPr/>
           </p:nvGrpSpPr>
           <p:grpSpPr>
             <a:xfrm>
               <a:off x="1260000" y="4140000"/>
-              <a:ext cx="1530360" cy="504360"/>
+              <a:ext cx="1530000" cy="504000"/>
               <a:chOff x="1260000" y="4140000"/>
-              <a:chExt cx="1530360" cy="504360"/>
+              <a:chExt cx="1530000" cy="504000"/>
             </a:xfrm>
           </p:grpSpPr>
           <p:sp>
             <p:nvSpPr>
-              <p:cNvPr id="44" name="Shape 1"/>
+              <p:cNvPr id="43" name="Shape 1"/>
               <p:cNvSpPr/>
               <p:nvPr/>
             </p:nvSpPr>
             <p:spPr>
               <a:xfrm>
                 <a:off x="1710000" y="4140000"/>
-                <a:ext cx="1080360" cy="504360"/>
+                <a:ext cx="1080000" cy="504000"/>
               </a:xfrm>
               <a:prstGeom prst="rect">
                 <a:avLst/>
@@ -2799,14 +2969,14 @@
           </p:sp>
           <p:sp>
             <p:nvSpPr>
-              <p:cNvPr id="45" name=""/>
+              <p:cNvPr id="44" name=""/>
               <p:cNvSpPr/>
               <p:nvPr/>
             </p:nvSpPr>
             <p:spPr>
               <a:xfrm>
                 <a:off x="1260000" y="4212000"/>
-                <a:ext cx="360000" cy="360000"/>
+                <a:ext cx="359640" cy="359640"/>
               </a:xfrm>
               <a:custGeom>
                 <a:avLst/>
@@ -2857,28 +3027,28 @@
         </p:grpSp>
         <p:grpSp>
           <p:nvGrpSpPr>
-            <p:cNvPr id="46" name=""/>
+            <p:cNvPr id="45" name=""/>
             <p:cNvGrpSpPr/>
             <p:nvPr/>
           </p:nvGrpSpPr>
           <p:grpSpPr>
             <a:xfrm>
-              <a:off x="1260000" y="4896000"/>
-              <a:ext cx="1530360" cy="504360"/>
-              <a:chOff x="1260000" y="4896000"/>
-              <a:chExt cx="1530360" cy="504360"/>
+              <a:off x="1259640" y="4896000"/>
+              <a:ext cx="1530360" cy="504000"/>
+              <a:chOff x="1259640" y="4896000"/>
+              <a:chExt cx="1530360" cy="504000"/>
             </a:xfrm>
           </p:grpSpPr>
           <p:sp>
             <p:nvSpPr>
-              <p:cNvPr id="47" name="Shape 2"/>
+              <p:cNvPr id="46" name="Shape 2"/>
               <p:cNvSpPr/>
               <p:nvPr/>
             </p:nvSpPr>
             <p:spPr>
               <a:xfrm>
                 <a:off x="1710000" y="4896000"/>
-                <a:ext cx="1080360" cy="504360"/>
+                <a:ext cx="1080000" cy="504000"/>
               </a:xfrm>
               <a:prstGeom prst="rect">
                 <a:avLst/>
@@ -2899,14 +3069,14 @@
           </p:sp>
           <p:sp>
             <p:nvSpPr>
-              <p:cNvPr id="48" name=""/>
+              <p:cNvPr id="47" name=""/>
               <p:cNvSpPr/>
               <p:nvPr/>
             </p:nvSpPr>
             <p:spPr>
               <a:xfrm flipH="1">
-                <a:off x="1260000" y="4968000"/>
-                <a:ext cx="360000" cy="360000"/>
+                <a:off x="1259280" y="4968000"/>
+                <a:ext cx="359640" cy="359640"/>
               </a:xfrm>
               <a:custGeom>
                 <a:avLst/>
@@ -2960,28 +3130,28 @@
       </p:grpSp>
       <p:grpSp>
         <p:nvGrpSpPr>
-          <p:cNvPr id="49" name=""/>
+          <p:cNvPr id="48" name=""/>
           <p:cNvGrpSpPr/>
           <p:nvPr/>
         </p:nvGrpSpPr>
         <p:grpSpPr>
           <a:xfrm>
             <a:off x="1395000" y="5598000"/>
-            <a:ext cx="1620000" cy="1620000"/>
+            <a:ext cx="1619640" cy="1619640"/>
             <a:chOff x="1395000" y="5598000"/>
-            <a:chExt cx="1620000" cy="1620000"/>
+            <a:chExt cx="1619640" cy="1619640"/>
           </a:xfrm>
         </p:grpSpPr>
         <p:sp>
           <p:nvSpPr>
-            <p:cNvPr id="50" name=""/>
+            <p:cNvPr id="49" name=""/>
             <p:cNvSpPr/>
             <p:nvPr/>
           </p:nvSpPr>
           <p:spPr>
             <a:xfrm>
               <a:off x="1395000" y="5598000"/>
-              <a:ext cx="1620000" cy="1620000"/>
+              <a:ext cx="1619640" cy="1619640"/>
             </a:xfrm>
             <a:prstGeom prst="ellipse">
               <a:avLst/>
@@ -3006,55 +3176,74 @@
             </a:bodyPr>
             <a:p>
               <a:pPr algn="ctr">
+                <a:lnSpc>
+                  <a:spcPct val="100000"/>
+                </a:lnSpc>
                 <a:buNone/>
               </a:pPr>
               <a:endParaRPr b="0" lang="en-GB" sz="1800" spc="-1" strike="noStrike">
-                <a:latin typeface="Ubuntu"/>
+                <a:latin typeface="Arial"/>
               </a:endParaRPr>
             </a:p>
             <a:p>
               <a:pPr algn="ctr">
+                <a:lnSpc>
+                  <a:spcPct val="100000"/>
+                </a:lnSpc>
                 <a:buNone/>
               </a:pPr>
               <a:endParaRPr b="0" lang="en-GB" sz="1800" spc="-1" strike="noStrike">
-                <a:latin typeface="Ubuntu"/>
+                <a:latin typeface="Arial"/>
               </a:endParaRPr>
             </a:p>
             <a:p>
               <a:pPr algn="ctr">
+                <a:lnSpc>
+                  <a:spcPct val="100000"/>
+                </a:lnSpc>
                 <a:buNone/>
               </a:pPr>
               <a:endParaRPr b="0" lang="en-GB" sz="1800" spc="-1" strike="noStrike">
-                <a:latin typeface="Ubuntu"/>
+                <a:latin typeface="Arial"/>
               </a:endParaRPr>
             </a:p>
             <a:p>
               <a:pPr algn="ctr">
+                <a:lnSpc>
+                  <a:spcPct val="100000"/>
+                </a:lnSpc>
                 <a:buNone/>
               </a:pPr>
               <a:endParaRPr b="0" lang="en-GB" sz="1800" spc="-1" strike="noStrike">
-                <a:latin typeface="Ubuntu"/>
+                <a:latin typeface="Arial"/>
               </a:endParaRPr>
             </a:p>
             <a:p>
               <a:pPr algn="ctr">
+                <a:lnSpc>
+                  <a:spcPct val="100000"/>
+                </a:lnSpc>
                 <a:buNone/>
               </a:pPr>
               <a:r>
                 <a:rPr b="0" lang="en-GB" sz="1800" spc="-1" strike="noStrike">
+                  <a:solidFill>
+                    <a:srgbClr val="000000"/>
+                  </a:solidFill>
                   <a:latin typeface="Ubuntu"/>
+                  <a:ea typeface="DejaVu Sans"/>
                 </a:rPr>
                 <a:t>Grid</a:t>
               </a:r>
               <a:endParaRPr b="0" lang="en-GB" sz="1800" spc="-1" strike="noStrike">
-                <a:latin typeface="Ubuntu"/>
+                <a:latin typeface="Arial"/>
               </a:endParaRPr>
             </a:p>
           </p:txBody>
         </p:sp>
         <p:pic>
           <p:nvPicPr>
-            <p:cNvPr id="51" name="" descr=""/>
+            <p:cNvPr id="50" name="" descr=""/>
             <p:cNvPicPr/>
             <p:nvPr/>
           </p:nvPicPr>
@@ -3065,7 +3254,7 @@
           <p:spPr>
             <a:xfrm>
               <a:off x="1854360" y="5892480"/>
-              <a:ext cx="701280" cy="700920"/>
+              <a:ext cx="700920" cy="700560"/>
             </a:xfrm>
             <a:prstGeom prst="rect">
               <a:avLst/>
@@ -3078,14 +3267,14 @@
       </p:grpSp>
       <p:sp>
         <p:nvSpPr>
-          <p:cNvPr id="52" name=""/>
+          <p:cNvPr id="51" name=""/>
           <p:cNvSpPr/>
           <p:nvPr/>
         </p:nvSpPr>
         <p:spPr>
           <a:xfrm>
             <a:off x="3420000" y="6228000"/>
-            <a:ext cx="918000" cy="360000"/>
+            <a:ext cx="917640" cy="359640"/>
           </a:xfrm>
           <a:prstGeom prst="rect">
             <a:avLst/>
@@ -3106,14 +3295,14 @@
       </p:sp>
       <p:sp>
         <p:nvSpPr>
-          <p:cNvPr id="53" name=""/>
+          <p:cNvPr id="52" name=""/>
           <p:cNvSpPr/>
           <p:nvPr/>
         </p:nvSpPr>
         <p:spPr>
           <a:xfrm>
             <a:off x="5310000" y="4500000"/>
-            <a:ext cx="360000" cy="918000"/>
+            <a:ext cx="359640" cy="917640"/>
           </a:xfrm>
           <a:prstGeom prst="rect">
             <a:avLst/>
@@ -3134,28 +3323,28 @@
       </p:sp>
       <p:grpSp>
         <p:nvGrpSpPr>
-          <p:cNvPr id="54" name=""/>
+          <p:cNvPr id="53" name=""/>
           <p:cNvGrpSpPr/>
           <p:nvPr/>
         </p:nvGrpSpPr>
         <p:grpSpPr>
           <a:xfrm>
             <a:off x="4680000" y="2700000"/>
-            <a:ext cx="1620000" cy="1620000"/>
+            <a:ext cx="1619640" cy="1619640"/>
             <a:chOff x="4680000" y="2700000"/>
-            <a:chExt cx="1620000" cy="1620000"/>
+            <a:chExt cx="1619640" cy="1619640"/>
           </a:xfrm>
         </p:grpSpPr>
         <p:sp>
           <p:nvSpPr>
-            <p:cNvPr id="55" name=""/>
+            <p:cNvPr id="54" name=""/>
             <p:cNvSpPr/>
             <p:nvPr/>
           </p:nvSpPr>
           <p:spPr>
             <a:xfrm>
               <a:off x="4680000" y="2700000"/>
-              <a:ext cx="1620000" cy="1620000"/>
+              <a:ext cx="1619640" cy="1619640"/>
             </a:xfrm>
             <a:prstGeom prst="ellipse">
               <a:avLst/>
@@ -3180,55 +3369,74 @@
             </a:bodyPr>
             <a:p>
               <a:pPr algn="ctr">
+                <a:lnSpc>
+                  <a:spcPct val="100000"/>
+                </a:lnSpc>
                 <a:buNone/>
               </a:pPr>
               <a:endParaRPr b="0" lang="en-GB" sz="1800" spc="-1" strike="noStrike">
-                <a:latin typeface="Ubuntu"/>
+                <a:latin typeface="Arial"/>
               </a:endParaRPr>
             </a:p>
             <a:p>
               <a:pPr algn="ctr">
+                <a:lnSpc>
+                  <a:spcPct val="100000"/>
+                </a:lnSpc>
                 <a:buNone/>
               </a:pPr>
               <a:endParaRPr b="0" lang="en-GB" sz="1800" spc="-1" strike="noStrike">
-                <a:latin typeface="Ubuntu"/>
+                <a:latin typeface="Arial"/>
               </a:endParaRPr>
             </a:p>
             <a:p>
               <a:pPr algn="ctr">
+                <a:lnSpc>
+                  <a:spcPct val="100000"/>
+                </a:lnSpc>
                 <a:buNone/>
               </a:pPr>
               <a:endParaRPr b="0" lang="en-GB" sz="1800" spc="-1" strike="noStrike">
-                <a:latin typeface="Ubuntu"/>
+                <a:latin typeface="Arial"/>
               </a:endParaRPr>
             </a:p>
             <a:p>
               <a:pPr algn="ctr">
+                <a:lnSpc>
+                  <a:spcPct val="100000"/>
+                </a:lnSpc>
                 <a:buNone/>
               </a:pPr>
               <a:endParaRPr b="0" lang="en-GB" sz="1800" spc="-1" strike="noStrike">
-                <a:latin typeface="Ubuntu"/>
+                <a:latin typeface="Arial"/>
               </a:endParaRPr>
             </a:p>
             <a:p>
               <a:pPr algn="ctr">
+                <a:lnSpc>
+                  <a:spcPct val="100000"/>
+                </a:lnSpc>
                 <a:buNone/>
               </a:pPr>
               <a:r>
                 <a:rPr b="0" lang="en-GB" sz="1800" spc="-1" strike="noStrike">
+                  <a:solidFill>
+                    <a:srgbClr val="000000"/>
+                  </a:solidFill>
                   <a:latin typeface="Ubuntu"/>
+                  <a:ea typeface="DejaVu Sans"/>
                 </a:rPr>
                 <a:t>Solar</a:t>
               </a:r>
               <a:endParaRPr b="0" lang="en-GB" sz="1800" spc="-1" strike="noStrike">
-                <a:latin typeface="Ubuntu"/>
+                <a:latin typeface="Arial"/>
               </a:endParaRPr>
             </a:p>
           </p:txBody>
         </p:sp>
         <p:pic>
           <p:nvPicPr>
-            <p:cNvPr id="56" name="" descr=""/>
+            <p:cNvPr id="55" name="" descr=""/>
             <p:cNvPicPr/>
             <p:nvPr/>
           </p:nvPicPr>
@@ -3239,7 +3447,7 @@
           <p:spPr>
             <a:xfrm>
               <a:off x="5086440" y="2988000"/>
-              <a:ext cx="807480" cy="720000"/>
+              <a:ext cx="807120" cy="719640"/>
             </a:xfrm>
             <a:prstGeom prst="rect">
               <a:avLst/>
@@ -3252,14 +3460,14 @@
       </p:grpSp>
       <p:sp>
         <p:nvSpPr>
-          <p:cNvPr id="57" name="Shape 1"/>
+          <p:cNvPr id="56" name="Shape 1"/>
           <p:cNvSpPr/>
           <p:nvPr/>
         </p:nvSpPr>
         <p:spPr>
           <a:xfrm>
             <a:off x="6515640" y="6156000"/>
-            <a:ext cx="1080360" cy="504360"/>
+            <a:ext cx="1080000" cy="504000"/>
           </a:xfrm>
           <a:prstGeom prst="rect">
             <a:avLst/>
@@ -3280,14 +3488,14 @@
       </p:sp>
       <p:sp>
         <p:nvSpPr>
-          <p:cNvPr id="58" name="Shape 3"/>
+          <p:cNvPr id="57" name="Shape 3"/>
           <p:cNvSpPr/>
           <p:nvPr/>
         </p:nvSpPr>
         <p:spPr>
           <a:xfrm>
             <a:off x="6515640" y="3258000"/>
-            <a:ext cx="1080360" cy="504360"/>
+            <a:ext cx="1080000" cy="504000"/>
           </a:xfrm>
           <a:prstGeom prst="rect">
             <a:avLst/>
@@ -3308,28 +3516,28 @@
       </p:sp>
       <p:grpSp>
         <p:nvGrpSpPr>
-          <p:cNvPr id="59" name=""/>
+          <p:cNvPr id="58" name=""/>
           <p:cNvGrpSpPr/>
           <p:nvPr/>
         </p:nvGrpSpPr>
         <p:grpSpPr>
           <a:xfrm>
             <a:off x="4680000" y="5598000"/>
-            <a:ext cx="1620000" cy="1620000"/>
+            <a:ext cx="1619640" cy="1619640"/>
             <a:chOff x="4680000" y="5598000"/>
-            <a:chExt cx="1620000" cy="1620000"/>
+            <a:chExt cx="1619640" cy="1619640"/>
           </a:xfrm>
         </p:grpSpPr>
         <p:sp>
           <p:nvSpPr>
-            <p:cNvPr id="60" name=""/>
+            <p:cNvPr id="59" name=""/>
             <p:cNvSpPr/>
             <p:nvPr/>
           </p:nvSpPr>
           <p:spPr>
             <a:xfrm>
               <a:off x="4680000" y="5598000"/>
-              <a:ext cx="1620000" cy="1620000"/>
+              <a:ext cx="1619640" cy="1619640"/>
             </a:xfrm>
             <a:prstGeom prst="ellipse">
               <a:avLst/>
@@ -3354,55 +3562,74 @@
             </a:bodyPr>
             <a:p>
               <a:pPr algn="ctr">
+                <a:lnSpc>
+                  <a:spcPct val="100000"/>
+                </a:lnSpc>
                 <a:buNone/>
               </a:pPr>
               <a:endParaRPr b="0" lang="en-GB" sz="1800" spc="-1" strike="noStrike">
-                <a:latin typeface="Ubuntu"/>
+                <a:latin typeface="Arial"/>
               </a:endParaRPr>
             </a:p>
             <a:p>
               <a:pPr algn="ctr">
+                <a:lnSpc>
+                  <a:spcPct val="100000"/>
+                </a:lnSpc>
                 <a:buNone/>
               </a:pPr>
               <a:endParaRPr b="0" lang="en-GB" sz="1800" spc="-1" strike="noStrike">
-                <a:latin typeface="Ubuntu"/>
+                <a:latin typeface="Arial"/>
               </a:endParaRPr>
             </a:p>
             <a:p>
               <a:pPr algn="ctr">
+                <a:lnSpc>
+                  <a:spcPct val="100000"/>
+                </a:lnSpc>
                 <a:buNone/>
               </a:pPr>
               <a:endParaRPr b="0" lang="en-GB" sz="1800" spc="-1" strike="noStrike">
-                <a:latin typeface="Ubuntu"/>
+                <a:latin typeface="Arial"/>
               </a:endParaRPr>
             </a:p>
             <a:p>
               <a:pPr algn="ctr">
+                <a:lnSpc>
+                  <a:spcPct val="100000"/>
+                </a:lnSpc>
                 <a:buNone/>
               </a:pPr>
               <a:endParaRPr b="0" lang="en-GB" sz="1800" spc="-1" strike="noStrike">
-                <a:latin typeface="Ubuntu"/>
+                <a:latin typeface="Arial"/>
               </a:endParaRPr>
             </a:p>
             <a:p>
               <a:pPr algn="ctr">
+                <a:lnSpc>
+                  <a:spcPct val="100000"/>
+                </a:lnSpc>
                 <a:buNone/>
               </a:pPr>
               <a:r>
                 <a:rPr b="0" lang="en-GB" sz="1800" spc="-1" strike="noStrike">
+                  <a:solidFill>
+                    <a:srgbClr val="000000"/>
+                  </a:solidFill>
                   <a:latin typeface="Ubuntu"/>
+                  <a:ea typeface="DejaVu Sans"/>
                 </a:rPr>
                 <a:t>Home</a:t>
               </a:r>
               <a:endParaRPr b="0" lang="en-GB" sz="1800" spc="-1" strike="noStrike">
-                <a:latin typeface="Ubuntu"/>
+                <a:latin typeface="Arial"/>
               </a:endParaRPr>
             </a:p>
           </p:txBody>
         </p:sp>
         <p:pic>
           <p:nvPicPr>
-            <p:cNvPr id="61" name="" descr=""/>
+            <p:cNvPr id="60" name="" descr=""/>
             <p:cNvPicPr/>
             <p:nvPr/>
           </p:nvPicPr>
@@ -3413,7 +3640,7 @@
           <p:spPr>
             <a:xfrm>
               <a:off x="5040000" y="5766840"/>
-              <a:ext cx="893160" cy="893160"/>
+              <a:ext cx="892800" cy="892800"/>
             </a:xfrm>
             <a:prstGeom prst="rect">
               <a:avLst/>
@@ -3424,6 +3651,81 @@
           </p:spPr>
         </p:pic>
       </p:grpSp>
+      <p:sp>
+        <p:nvSpPr>
+          <p:cNvPr id="61" name="PlaceHolder 1"/>
+          <p:cNvSpPr txBox="1"/>
+          <p:nvPr/>
+        </p:nvSpPr>
+        <p:spPr>
+          <a:xfrm>
+            <a:off x="2807640" y="360000"/>
+            <a:ext cx="3384000" cy="1501920"/>
+          </a:xfrm>
+          <a:prstGeom prst="rect">
+            <a:avLst/>
+          </a:prstGeom>
+          <a:noFill/>
+          <a:ln w="36000">
+            <a:solidFill>
+              <a:srgbClr val="000000"/>
+            </a:solidFill>
+            <a:round/>
+          </a:ln>
+        </p:spPr>
+        <p:txBody>
+          <a:bodyPr lIns="18000" rIns="18000" tIns="18000" bIns="18000" anchor="ctr">
+            <a:noAutofit/>
+          </a:bodyPr>
+          <a:p>
+            <a:pPr algn="ctr">
+              <a:lnSpc>
+                <a:spcPct val="100000"/>
+              </a:lnSpc>
+              <a:buNone/>
+            </a:pPr>
+            <a:r>
+              <a:rPr b="0" lang="en-GB" sz="6980" spc="-1" strike="noStrike">
+                <a:latin typeface="Ubuntu"/>
+              </a:rPr>
+              <a:t>E</a:t>
+            </a:r>
+            <a:r>
+              <a:rPr b="0" lang="en-GB" sz="6980" spc="-1" strike="noStrike">
+                <a:latin typeface="Ubuntu"/>
+              </a:rPr>
+              <a:t>n</a:t>
+            </a:r>
+            <a:r>
+              <a:rPr b="0" lang="en-GB" sz="6980" spc="-1" strike="noStrike">
+                <a:latin typeface="Ubuntu"/>
+              </a:rPr>
+              <a:t>e</a:t>
+            </a:r>
+            <a:r>
+              <a:rPr b="0" lang="en-GB" sz="6980" spc="-1" strike="noStrike">
+                <a:latin typeface="Ubuntu"/>
+              </a:rPr>
+              <a:t>r</a:t>
+            </a:r>
+            <a:r>
+              <a:rPr b="0" lang="en-GB" sz="6980" spc="-1" strike="noStrike">
+                <a:latin typeface="Ubuntu"/>
+              </a:rPr>
+              <a:t>g</a:t>
+            </a:r>
+            <a:r>
+              <a:rPr b="0" lang="en-GB" sz="6980" spc="-1" strike="noStrike">
+                <a:latin typeface="Ubuntu"/>
+              </a:rPr>
+              <a:t>y</a:t>
+            </a:r>
+            <a:endParaRPr b="0" lang="en-GB" sz="6980" spc="-1" strike="noStrike">
+              <a:latin typeface="Arial"/>
+            </a:endParaRPr>
+          </a:p>
+        </p:txBody>
+      </p:sp>
     </p:spTree>
   </p:cSld>
   <mc:AlternateContent>
@@ -3456,57 +3758,14 @@
       </p:grpSpPr>
       <p:sp>
         <p:nvSpPr>
-          <p:cNvPr id="62" name="PlaceHolder 1"/>
-          <p:cNvSpPr>
-            <a:spLocks noGrp="1"/>
-          </p:cNvSpPr>
-          <p:nvPr>
-            <p:ph type="title"/>
-          </p:nvPr>
-        </p:nvSpPr>
-        <p:spPr>
-          <a:xfrm>
-            <a:off x="-2519640" y="-180000"/>
-            <a:ext cx="8099640" cy="1502280"/>
-          </a:xfrm>
-          <a:prstGeom prst="rect">
-            <a:avLst/>
-          </a:prstGeom>
-          <a:noFill/>
-          <a:ln w="0">
-            <a:noFill/>
-          </a:ln>
-        </p:spPr>
-        <p:txBody>
-          <a:bodyPr lIns="0" rIns="0" tIns="0" bIns="0" anchor="ctr">
-            <a:noAutofit/>
-          </a:bodyPr>
-          <a:p>
-            <a:pPr algn="ctr">
-              <a:buNone/>
-            </a:pPr>
-            <a:r>
-              <a:rPr b="0" lang="en-GB" sz="6980" spc="-1" strike="noStrike">
-                <a:latin typeface="Ubuntu"/>
-              </a:rPr>
-              <a:t>Energy</a:t>
-            </a:r>
-            <a:endParaRPr b="0" lang="en-GB" sz="6980" spc="-1" strike="noStrike">
-              <a:latin typeface="Arial"/>
-            </a:endParaRPr>
-          </a:p>
-        </p:txBody>
-      </p:sp>
-      <p:sp>
-        <p:nvSpPr>
-          <p:cNvPr id="63" name=""/>
+          <p:cNvPr id="62" name=""/>
           <p:cNvSpPr/>
           <p:nvPr/>
         </p:nvSpPr>
         <p:spPr>
           <a:xfrm>
-            <a:off x="2160000" y="1440000"/>
-            <a:ext cx="360000" cy="360000"/>
+            <a:off x="2124000" y="1836360"/>
+            <a:ext cx="359640" cy="359640"/>
           </a:xfrm>
           <a:custGeom>
             <a:avLst/>
@@ -3556,14 +3815,14 @@
       </p:sp>
       <p:sp>
         <p:nvSpPr>
-          <p:cNvPr id="64" name=""/>
+          <p:cNvPr id="63" name=""/>
           <p:cNvSpPr/>
           <p:nvPr/>
         </p:nvSpPr>
         <p:spPr>
           <a:xfrm flipH="1">
-            <a:off x="2160000" y="4140000"/>
-            <a:ext cx="360000" cy="360000"/>
+            <a:off x="2123280" y="4536360"/>
+            <a:ext cx="359640" cy="359640"/>
           </a:xfrm>
           <a:custGeom>
             <a:avLst/>
@@ -3615,28 +3874,28 @@
       </p:sp>
       <p:grpSp>
         <p:nvGrpSpPr>
-          <p:cNvPr id="65" name=""/>
+          <p:cNvPr id="64" name=""/>
           <p:cNvGrpSpPr/>
           <p:nvPr/>
         </p:nvGrpSpPr>
         <p:grpSpPr>
           <a:xfrm>
-            <a:off x="1800000" y="2160000"/>
-            <a:ext cx="1620000" cy="1620000"/>
-            <a:chOff x="1800000" y="2160000"/>
-            <a:chExt cx="1620000" cy="1620000"/>
+            <a:off x="1764000" y="2556360"/>
+            <a:ext cx="1619640" cy="1619640"/>
+            <a:chOff x="1764000" y="2556360"/>
+            <a:chExt cx="1619640" cy="1619640"/>
           </a:xfrm>
         </p:grpSpPr>
         <p:sp>
           <p:nvSpPr>
-            <p:cNvPr id="66" name=""/>
+            <p:cNvPr id="65" name=""/>
             <p:cNvSpPr/>
             <p:nvPr/>
           </p:nvSpPr>
           <p:spPr>
             <a:xfrm>
-              <a:off x="1800000" y="2160000"/>
-              <a:ext cx="1620000" cy="1620000"/>
+              <a:off x="1764000" y="2556360"/>
+              <a:ext cx="1619640" cy="1619640"/>
             </a:xfrm>
             <a:prstGeom prst="ellipse">
               <a:avLst/>
@@ -3661,55 +3920,74 @@
             </a:bodyPr>
             <a:p>
               <a:pPr algn="ctr">
+                <a:lnSpc>
+                  <a:spcPct val="100000"/>
+                </a:lnSpc>
                 <a:buNone/>
               </a:pPr>
               <a:endParaRPr b="0" lang="en-GB" sz="1800" spc="-1" strike="noStrike">
-                <a:latin typeface="Ubuntu"/>
+                <a:latin typeface="Arial"/>
               </a:endParaRPr>
             </a:p>
             <a:p>
               <a:pPr algn="ctr">
+                <a:lnSpc>
+                  <a:spcPct val="100000"/>
+                </a:lnSpc>
                 <a:buNone/>
               </a:pPr>
               <a:endParaRPr b="0" lang="en-GB" sz="1800" spc="-1" strike="noStrike">
-                <a:latin typeface="Ubuntu"/>
+                <a:latin typeface="Arial"/>
               </a:endParaRPr>
             </a:p>
             <a:p>
               <a:pPr algn="ctr">
+                <a:lnSpc>
+                  <a:spcPct val="100000"/>
+                </a:lnSpc>
                 <a:buNone/>
               </a:pPr>
               <a:endParaRPr b="0" lang="en-GB" sz="1800" spc="-1" strike="noStrike">
-                <a:latin typeface="Ubuntu"/>
+                <a:latin typeface="Arial"/>
               </a:endParaRPr>
             </a:p>
             <a:p>
               <a:pPr algn="ctr">
+                <a:lnSpc>
+                  <a:spcPct val="100000"/>
+                </a:lnSpc>
                 <a:buNone/>
               </a:pPr>
               <a:endParaRPr b="0" lang="en-GB" sz="1800" spc="-1" strike="noStrike">
-                <a:latin typeface="Ubuntu"/>
+                <a:latin typeface="Arial"/>
               </a:endParaRPr>
             </a:p>
             <a:p>
               <a:pPr algn="ctr">
+                <a:lnSpc>
+                  <a:spcPct val="100000"/>
+                </a:lnSpc>
                 <a:buNone/>
               </a:pPr>
               <a:r>
                 <a:rPr b="0" lang="en-GB" sz="1800" spc="-1" strike="noStrike">
+                  <a:solidFill>
+                    <a:srgbClr val="000000"/>
+                  </a:solidFill>
                   <a:latin typeface="Ubuntu"/>
+                  <a:ea typeface="DejaVu Sans"/>
                 </a:rPr>
                 <a:t>Grid</a:t>
               </a:r>
               <a:endParaRPr b="0" lang="en-GB" sz="1800" spc="-1" strike="noStrike">
-                <a:latin typeface="Ubuntu"/>
+                <a:latin typeface="Arial"/>
               </a:endParaRPr>
             </a:p>
           </p:txBody>
         </p:sp>
         <p:pic>
           <p:nvPicPr>
-            <p:cNvPr id="67" name="" descr=""/>
+            <p:cNvPr id="66" name="" descr=""/>
             <p:cNvPicPr/>
             <p:nvPr/>
           </p:nvPicPr>
@@ -3719,8 +3997,8 @@
           </p:blipFill>
           <p:spPr>
             <a:xfrm>
-              <a:off x="2259360" y="2454480"/>
-              <a:ext cx="701280" cy="700920"/>
+              <a:off x="2223360" y="2850840"/>
+              <a:ext cx="700920" cy="700560"/>
             </a:xfrm>
             <a:prstGeom prst="rect">
               <a:avLst/>
@@ -3733,28 +4011,28 @@
       </p:grpSp>
       <p:grpSp>
         <p:nvGrpSpPr>
-          <p:cNvPr id="68" name=""/>
+          <p:cNvPr id="67" name=""/>
           <p:cNvGrpSpPr/>
           <p:nvPr/>
         </p:nvGrpSpPr>
         <p:grpSpPr>
           <a:xfrm>
-            <a:off x="180000" y="1260000"/>
-            <a:ext cx="1620000" cy="1620000"/>
-            <a:chOff x="180000" y="1260000"/>
-            <a:chExt cx="1620000" cy="1620000"/>
+            <a:off x="144000" y="1656360"/>
+            <a:ext cx="1619640" cy="1619640"/>
+            <a:chOff x="144000" y="1656360"/>
+            <a:chExt cx="1619640" cy="1619640"/>
           </a:xfrm>
         </p:grpSpPr>
         <p:sp>
           <p:nvSpPr>
-            <p:cNvPr id="69" name=""/>
+            <p:cNvPr id="68" name=""/>
             <p:cNvSpPr/>
             <p:nvPr/>
           </p:nvSpPr>
           <p:spPr>
             <a:xfrm>
-              <a:off x="180000" y="1260000"/>
-              <a:ext cx="1620000" cy="1620000"/>
+              <a:off x="144000" y="1656360"/>
+              <a:ext cx="1619640" cy="1619640"/>
             </a:xfrm>
             <a:prstGeom prst="ellipse">
               <a:avLst/>
@@ -3779,55 +4057,74 @@
             </a:bodyPr>
             <a:p>
               <a:pPr algn="ctr">
+                <a:lnSpc>
+                  <a:spcPct val="100000"/>
+                </a:lnSpc>
                 <a:buNone/>
               </a:pPr>
               <a:endParaRPr b="0" lang="en-GB" sz="1800" spc="-1" strike="noStrike">
-                <a:latin typeface="Ubuntu"/>
+                <a:latin typeface="Arial"/>
               </a:endParaRPr>
             </a:p>
             <a:p>
               <a:pPr algn="ctr">
+                <a:lnSpc>
+                  <a:spcPct val="100000"/>
+                </a:lnSpc>
                 <a:buNone/>
               </a:pPr>
               <a:endParaRPr b="0" lang="en-GB" sz="1800" spc="-1" strike="noStrike">
-                <a:latin typeface="Ubuntu"/>
+                <a:latin typeface="Arial"/>
               </a:endParaRPr>
             </a:p>
             <a:p>
               <a:pPr algn="ctr">
+                <a:lnSpc>
+                  <a:spcPct val="100000"/>
+                </a:lnSpc>
                 <a:buNone/>
               </a:pPr>
               <a:endParaRPr b="0" lang="en-GB" sz="1800" spc="-1" strike="noStrike">
-                <a:latin typeface="Ubuntu"/>
+                <a:latin typeface="Arial"/>
               </a:endParaRPr>
             </a:p>
             <a:p>
               <a:pPr algn="ctr">
+                <a:lnSpc>
+                  <a:spcPct val="100000"/>
+                </a:lnSpc>
                 <a:buNone/>
               </a:pPr>
               <a:endParaRPr b="0" lang="en-GB" sz="1800" spc="-1" strike="noStrike">
-                <a:latin typeface="Ubuntu"/>
+                <a:latin typeface="Arial"/>
               </a:endParaRPr>
             </a:p>
             <a:p>
               <a:pPr algn="ctr">
+                <a:lnSpc>
+                  <a:spcPct val="100000"/>
+                </a:lnSpc>
                 <a:buNone/>
               </a:pPr>
               <a:r>
                 <a:rPr b="0" lang="en-GB" sz="1800" spc="-1" strike="noStrike">
+                  <a:solidFill>
+                    <a:srgbClr val="000000"/>
+                  </a:solidFill>
                   <a:latin typeface="Ubuntu"/>
+                  <a:ea typeface="DejaVu Sans"/>
                 </a:rPr>
                 <a:t>Solar</a:t>
               </a:r>
               <a:endParaRPr b="0" lang="en-GB" sz="1800" spc="-1" strike="noStrike">
-                <a:latin typeface="Ubuntu"/>
+                <a:latin typeface="Arial"/>
               </a:endParaRPr>
             </a:p>
           </p:txBody>
         </p:sp>
         <p:pic>
           <p:nvPicPr>
-            <p:cNvPr id="70" name="" descr=""/>
+            <p:cNvPr id="69" name="" descr=""/>
             <p:cNvPicPr/>
             <p:nvPr/>
           </p:nvPicPr>
@@ -3837,8 +4134,8 @@
           </p:blipFill>
           <p:spPr>
             <a:xfrm>
-              <a:off x="586440" y="1548000"/>
-              <a:ext cx="807480" cy="720000"/>
+              <a:off x="550440" y="1944360"/>
+              <a:ext cx="807120" cy="719640"/>
             </a:xfrm>
             <a:prstGeom prst="rect">
               <a:avLst/>
@@ -3851,28 +4148,28 @@
       </p:grpSp>
       <p:grpSp>
         <p:nvGrpSpPr>
-          <p:cNvPr id="71" name=""/>
+          <p:cNvPr id="70" name=""/>
           <p:cNvGrpSpPr/>
           <p:nvPr/>
         </p:nvGrpSpPr>
         <p:grpSpPr>
           <a:xfrm>
-            <a:off x="180000" y="3060000"/>
-            <a:ext cx="1620000" cy="1620000"/>
-            <a:chOff x="180000" y="3060000"/>
-            <a:chExt cx="1620000" cy="1620000"/>
+            <a:off x="144000" y="3456360"/>
+            <a:ext cx="1619640" cy="1619640"/>
+            <a:chOff x="144000" y="3456360"/>
+            <a:chExt cx="1619640" cy="1619640"/>
           </a:xfrm>
         </p:grpSpPr>
         <p:sp>
           <p:nvSpPr>
-            <p:cNvPr id="72" name=""/>
+            <p:cNvPr id="71" name=""/>
             <p:cNvSpPr/>
             <p:nvPr/>
           </p:nvSpPr>
           <p:spPr>
             <a:xfrm>
-              <a:off x="180000" y="3060000"/>
-              <a:ext cx="1620000" cy="1620000"/>
+              <a:off x="144000" y="3456360"/>
+              <a:ext cx="1619640" cy="1619640"/>
             </a:xfrm>
             <a:prstGeom prst="ellipse">
               <a:avLst/>
@@ -3897,55 +4194,74 @@
             </a:bodyPr>
             <a:p>
               <a:pPr algn="ctr">
+                <a:lnSpc>
+                  <a:spcPct val="100000"/>
+                </a:lnSpc>
                 <a:buNone/>
               </a:pPr>
               <a:endParaRPr b="0" lang="en-GB" sz="1800" spc="-1" strike="noStrike">
-                <a:latin typeface="Ubuntu"/>
+                <a:latin typeface="Arial"/>
               </a:endParaRPr>
             </a:p>
             <a:p>
               <a:pPr algn="ctr">
+                <a:lnSpc>
+                  <a:spcPct val="100000"/>
+                </a:lnSpc>
                 <a:buNone/>
               </a:pPr>
               <a:endParaRPr b="0" lang="en-GB" sz="1800" spc="-1" strike="noStrike">
-                <a:latin typeface="Ubuntu"/>
+                <a:latin typeface="Arial"/>
               </a:endParaRPr>
             </a:p>
             <a:p>
               <a:pPr algn="ctr">
+                <a:lnSpc>
+                  <a:spcPct val="100000"/>
+                </a:lnSpc>
                 <a:buNone/>
               </a:pPr>
               <a:endParaRPr b="0" lang="en-GB" sz="1800" spc="-1" strike="noStrike">
-                <a:latin typeface="Ubuntu"/>
+                <a:latin typeface="Arial"/>
               </a:endParaRPr>
             </a:p>
             <a:p>
               <a:pPr algn="ctr">
+                <a:lnSpc>
+                  <a:spcPct val="100000"/>
+                </a:lnSpc>
                 <a:buNone/>
               </a:pPr>
               <a:endParaRPr b="0" lang="en-GB" sz="1800" spc="-1" strike="noStrike">
-                <a:latin typeface="Ubuntu"/>
+                <a:latin typeface="Arial"/>
               </a:endParaRPr>
             </a:p>
             <a:p>
               <a:pPr algn="ctr">
+                <a:lnSpc>
+                  <a:spcPct val="100000"/>
+                </a:lnSpc>
                 <a:buNone/>
               </a:pPr>
               <a:r>
                 <a:rPr b="0" lang="en-GB" sz="1800" spc="-1" strike="noStrike">
+                  <a:solidFill>
+                    <a:srgbClr val="000000"/>
+                  </a:solidFill>
                   <a:latin typeface="Ubuntu"/>
+                  <a:ea typeface="DejaVu Sans"/>
                 </a:rPr>
                 <a:t>Home</a:t>
               </a:r>
               <a:endParaRPr b="0" lang="en-GB" sz="1800" spc="-1" strike="noStrike">
-                <a:latin typeface="Ubuntu"/>
+                <a:latin typeface="Arial"/>
               </a:endParaRPr>
             </a:p>
           </p:txBody>
         </p:sp>
         <p:pic>
           <p:nvPicPr>
-            <p:cNvPr id="73" name="" descr=""/>
+            <p:cNvPr id="72" name="" descr=""/>
             <p:cNvPicPr/>
             <p:nvPr/>
           </p:nvPicPr>
@@ -3955,8 +4271,8 @@
           </p:blipFill>
           <p:spPr>
             <a:xfrm>
-              <a:off x="540000" y="3228840"/>
-              <a:ext cx="893160" cy="893160"/>
+              <a:off x="504000" y="3625200"/>
+              <a:ext cx="892800" cy="892800"/>
             </a:xfrm>
             <a:prstGeom prst="rect">
               <a:avLst/>
@@ -3967,6 +4283,51 @@
           </p:spPr>
         </p:pic>
       </p:grpSp>
+      <p:sp>
+        <p:nvSpPr>
+          <p:cNvPr id="73" name="PlaceHolder 2"/>
+          <p:cNvSpPr txBox="1"/>
+          <p:nvPr/>
+        </p:nvSpPr>
+        <p:spPr>
+          <a:xfrm>
+            <a:off x="36000" y="72000"/>
+            <a:ext cx="3384000" cy="1501920"/>
+          </a:xfrm>
+          <a:prstGeom prst="rect">
+            <a:avLst/>
+          </a:prstGeom>
+          <a:noFill/>
+          <a:ln w="36000">
+            <a:solidFill>
+              <a:srgbClr val="000000"/>
+            </a:solidFill>
+            <a:round/>
+          </a:ln>
+        </p:spPr>
+        <p:txBody>
+          <a:bodyPr lIns="18000" rIns="18000" tIns="18000" bIns="18000" anchor="ctr">
+            <a:noAutofit/>
+          </a:bodyPr>
+          <a:p>
+            <a:pPr algn="ctr">
+              <a:lnSpc>
+                <a:spcPct val="100000"/>
+              </a:lnSpc>
+              <a:buNone/>
+            </a:pPr>
+            <a:r>
+              <a:rPr b="0" lang="en-GB" sz="6980" spc="-1" strike="noStrike">
+                <a:latin typeface="Ubuntu"/>
+              </a:rPr>
+              <a:t>Energy</a:t>
+            </a:r>
+            <a:endParaRPr b="0" lang="en-GB" sz="6980" spc="-1" strike="noStrike">
+              <a:latin typeface="Arial"/>
+            </a:endParaRPr>
+          </a:p>
+        </p:txBody>
+      </p:sp>
     </p:spTree>
   </p:cSld>
   <mc:AlternateContent>

</xml_diff>